<commit_message>
iteration 3 in AI
</commit_message>
<xml_diff>
--- a/figures/astar/raycast.pptx
+++ b/figures/astar/raycast.pptx
@@ -7,6 +7,7 @@
   <p:sldIdLst>
     <p:sldId id="256" r:id="rId2"/>
     <p:sldId id="257" r:id="rId3"/>
+    <p:sldId id="258" r:id="rId4"/>
   </p:sldIdLst>
   <p:sldSz cx="9144000" cy="6858000" type="screen4x3"/>
   <p:notesSz cx="6858000" cy="9144000"/>
@@ -4381,6 +4382,1743 @@
 </p:sld>
 </file>
 
+<file path=ppt/slides/slide3.xml><?xml version="1.0" encoding="utf-8"?>
+<p:sld xmlns:a="http://schemas.openxmlformats.org/drawingml/2006/main" xmlns:r="http://schemas.openxmlformats.org/officeDocument/2006/relationships" xmlns:p="http://schemas.openxmlformats.org/presentationml/2006/main">
+  <p:cSld>
+    <p:spTree>
+      <p:nvGrpSpPr>
+        <p:cNvPr id="1" name=""/>
+        <p:cNvGrpSpPr/>
+        <p:nvPr/>
+      </p:nvGrpSpPr>
+      <p:grpSpPr>
+        <a:xfrm>
+          <a:off x="0" y="0"/>
+          <a:ext cx="0" cy="0"/>
+          <a:chOff x="0" y="0"/>
+          <a:chExt cx="0" cy="0"/>
+        </a:xfrm>
+      </p:grpSpPr>
+      <p:grpSp>
+        <p:nvGrpSpPr>
+          <p:cNvPr id="2053" name="Group 2052"/>
+          <p:cNvGrpSpPr/>
+          <p:nvPr/>
+        </p:nvGrpSpPr>
+        <p:grpSpPr>
+          <a:xfrm>
+            <a:off x="805946" y="869202"/>
+            <a:ext cx="1511568" cy="1971242"/>
+            <a:chOff x="601568" y="980728"/>
+            <a:chExt cx="2098225" cy="2736304"/>
+          </a:xfrm>
+        </p:grpSpPr>
+        <p:pic>
+          <p:nvPicPr>
+            <p:cNvPr id="1028" name="Picture 4"/>
+            <p:cNvPicPr>
+              <a:picLocks noChangeAspect="1" noChangeArrowheads="1"/>
+            </p:cNvPicPr>
+            <p:nvPr/>
+          </p:nvPicPr>
+          <p:blipFill>
+            <a:blip r:embed="rId2">
+              <a:extLst>
+                <a:ext uri="{28A0092B-C50C-407E-A947-70E740481C1C}">
+                  <a14:useLocalDpi xmlns:a14="http://schemas.microsoft.com/office/drawing/2010/main" val="0"/>
+                </a:ext>
+              </a:extLst>
+            </a:blip>
+            <a:srcRect/>
+            <a:stretch>
+              <a:fillRect/>
+            </a:stretch>
+          </p:blipFill>
+          <p:spPr bwMode="auto">
+            <a:xfrm>
+              <a:off x="601568" y="980728"/>
+              <a:ext cx="2098224" cy="2725898"/>
+            </a:xfrm>
+            <a:prstGeom prst="rect">
+              <a:avLst/>
+            </a:prstGeom>
+            <a:ln>
+              <a:noFill/>
+            </a:ln>
+            <a:effectLst>
+              <a:outerShdw blurRad="292100" dist="139700" dir="2700000" algn="tl" rotWithShape="0">
+                <a:srgbClr val="333333">
+                  <a:alpha val="65000"/>
+                </a:srgbClr>
+              </a:outerShdw>
+            </a:effectLst>
+            <a:extLst>
+              <a:ext uri="{909E8E84-426E-40DD-AFC4-6F175D3DCCD1}">
+                <a14:hiddenFill xmlns:a14="http://schemas.microsoft.com/office/drawing/2010/main">
+                  <a:solidFill>
+                    <a:schemeClr val="accent1"/>
+                  </a:solidFill>
+                </a14:hiddenFill>
+              </a:ext>
+              <a:ext uri="{91240B29-F687-4F45-9708-019B960494DF}">
+                <a14:hiddenLine xmlns:a14="http://schemas.microsoft.com/office/drawing/2010/main" w="9525">
+                  <a:solidFill>
+                    <a:schemeClr val="tx1"/>
+                  </a:solidFill>
+                  <a:miter lim="800000"/>
+                  <a:headEnd/>
+                  <a:tailEnd/>
+                </a14:hiddenLine>
+              </a:ext>
+            </a:extLst>
+          </p:spPr>
+        </p:pic>
+        <p:sp>
+          <p:nvSpPr>
+            <p:cNvPr id="2052" name="Rectangle 2051"/>
+            <p:cNvSpPr/>
+            <p:nvPr/>
+          </p:nvSpPr>
+          <p:spPr>
+            <a:xfrm>
+              <a:off x="601569" y="2094525"/>
+              <a:ext cx="2098224" cy="1622507"/>
+            </a:xfrm>
+            <a:prstGeom prst="rect">
+              <a:avLst/>
+            </a:prstGeom>
+            <a:solidFill>
+              <a:srgbClr val="E6B9B8">
+                <a:alpha val="54902"/>
+              </a:srgbClr>
+            </a:solidFill>
+            <a:ln>
+              <a:noFill/>
+            </a:ln>
+          </p:spPr>
+          <p:style>
+            <a:lnRef idx="2">
+              <a:schemeClr val="accent1">
+                <a:shade val="50000"/>
+              </a:schemeClr>
+            </a:lnRef>
+            <a:fillRef idx="1">
+              <a:schemeClr val="accent1"/>
+            </a:fillRef>
+            <a:effectRef idx="0">
+              <a:schemeClr val="accent1"/>
+            </a:effectRef>
+            <a:fontRef idx="minor">
+              <a:schemeClr val="lt1"/>
+            </a:fontRef>
+          </p:style>
+          <p:txBody>
+            <a:bodyPr rtlCol="0" anchor="ctr"/>
+            <a:lstStyle/>
+            <a:p>
+              <a:pPr algn="ctr"/>
+              <a:endParaRPr lang="en-US"/>
+            </a:p>
+          </p:txBody>
+        </p:sp>
+        <p:pic>
+          <p:nvPicPr>
+            <p:cNvPr id="23" name="Picture 9" descr="C:\Users\AndersBender\AppData\Roaming\Skype\andersbender\media_messaging\media_cache\^3F60A93F08DDE063B5063BCBD834C97195A7C57F02DC6FBA14^pimgpsh_fullsize_distr.jpg"/>
+            <p:cNvPicPr>
+              <a:picLocks noChangeAspect="1" noChangeArrowheads="1"/>
+            </p:cNvPicPr>
+            <p:nvPr/>
+          </p:nvPicPr>
+          <p:blipFill>
+            <a:blip r:embed="rId3">
+              <a:extLst>
+                <a:ext uri="{BEBA8EAE-BF5A-486C-A8C5-ECC9F3942E4B}">
+                  <a14:imgProps xmlns:a14="http://schemas.microsoft.com/office/drawing/2010/main">
+                    <a14:imgLayer r:embed="rId4">
+                      <a14:imgEffect>
+                        <a14:backgroundRemoval t="7407" b="88889" l="5634" r="91549">
+                          <a14:foregroundMark x1="35211" y1="50000" x2="35211" y2="50000"/>
+                          <a14:foregroundMark x1="49296" y1="33333" x2="7042" y2="75926"/>
+                          <a14:foregroundMark x1="76056" y1="46296" x2="91549" y2="75926"/>
+                          <a14:foregroundMark x1="22535" y1="77778" x2="73239" y2="81481"/>
+                        </a14:backgroundRemoval>
+                      </a14:imgEffect>
+                    </a14:imgLayer>
+                  </a14:imgProps>
+                </a:ext>
+                <a:ext uri="{28A0092B-C50C-407E-A947-70E740481C1C}">
+                  <a14:useLocalDpi xmlns:a14="http://schemas.microsoft.com/office/drawing/2010/main" val="0"/>
+                </a:ext>
+              </a:extLst>
+            </a:blip>
+            <a:srcRect/>
+            <a:stretch>
+              <a:fillRect/>
+            </a:stretch>
+          </p:blipFill>
+          <p:spPr bwMode="auto">
+            <a:xfrm rot="19179872">
+              <a:off x="1848178" y="2458863"/>
+              <a:ext cx="493881" cy="375627"/>
+            </a:xfrm>
+            <a:prstGeom prst="rect">
+              <a:avLst/>
+            </a:prstGeom>
+            <a:noFill/>
+            <a:extLst>
+              <a:ext uri="{909E8E84-426E-40DD-AFC4-6F175D3DCCD1}">
+                <a14:hiddenFill xmlns:a14="http://schemas.microsoft.com/office/drawing/2010/main">
+                  <a:solidFill>
+                    <a:srgbClr val="FFFFFF"/>
+                  </a:solidFill>
+                </a14:hiddenFill>
+              </a:ext>
+            </a:extLst>
+          </p:spPr>
+        </p:pic>
+        <p:pic>
+          <p:nvPicPr>
+            <p:cNvPr id="24" name="Picture 2" descr="C:\Project\detfederepo\unity\Assets\Sprites\Enemies\Alien.png"/>
+            <p:cNvPicPr>
+              <a:picLocks noChangeAspect="1" noChangeArrowheads="1"/>
+            </p:cNvPicPr>
+            <p:nvPr/>
+          </p:nvPicPr>
+          <p:blipFill>
+            <a:blip r:embed="rId5">
+              <a:extLst>
+                <a:ext uri="{28A0092B-C50C-407E-A947-70E740481C1C}">
+                  <a14:useLocalDpi xmlns:a14="http://schemas.microsoft.com/office/drawing/2010/main" val="0"/>
+                </a:ext>
+              </a:extLst>
+            </a:blip>
+            <a:srcRect/>
+            <a:stretch>
+              <a:fillRect/>
+            </a:stretch>
+          </p:blipFill>
+          <p:spPr bwMode="auto">
+            <a:xfrm rot="3865126">
+              <a:off x="1081373" y="2975177"/>
+              <a:ext cx="487888" cy="487888"/>
+            </a:xfrm>
+            <a:prstGeom prst="rect">
+              <a:avLst/>
+            </a:prstGeom>
+            <a:noFill/>
+            <a:extLst>
+              <a:ext uri="{909E8E84-426E-40DD-AFC4-6F175D3DCCD1}">
+                <a14:hiddenFill xmlns:a14="http://schemas.microsoft.com/office/drawing/2010/main">
+                  <a:solidFill>
+                    <a:srgbClr val="FFFFFF"/>
+                  </a:solidFill>
+                </a14:hiddenFill>
+              </a:ext>
+            </a:extLst>
+          </p:spPr>
+        </p:pic>
+        <p:cxnSp>
+          <p:nvCxnSpPr>
+            <p:cNvPr id="5" name="Straight Connector 4"/>
+            <p:cNvCxnSpPr/>
+            <p:nvPr/>
+          </p:nvCxnSpPr>
+          <p:spPr>
+            <a:xfrm flipV="1">
+              <a:off x="1475656" y="2784813"/>
+              <a:ext cx="475907" cy="370137"/>
+            </a:xfrm>
+            <a:prstGeom prst="line">
+              <a:avLst/>
+            </a:prstGeom>
+            <a:ln w="38100">
+              <a:solidFill>
+                <a:srgbClr val="FFFF00"/>
+              </a:solidFill>
+              <a:prstDash val="sysDash"/>
+            </a:ln>
+          </p:spPr>
+          <p:style>
+            <a:lnRef idx="1">
+              <a:schemeClr val="accent1"/>
+            </a:lnRef>
+            <a:fillRef idx="0">
+              <a:schemeClr val="accent1"/>
+            </a:fillRef>
+            <a:effectRef idx="0">
+              <a:schemeClr val="accent1"/>
+            </a:effectRef>
+            <a:fontRef idx="minor">
+              <a:schemeClr val="tx1"/>
+            </a:fontRef>
+          </p:style>
+        </p:cxnSp>
+      </p:grpSp>
+      <p:grpSp>
+        <p:nvGrpSpPr>
+          <p:cNvPr id="2055" name="Group 2054"/>
+          <p:cNvGrpSpPr/>
+          <p:nvPr/>
+        </p:nvGrpSpPr>
+        <p:grpSpPr>
+          <a:xfrm>
+            <a:off x="4500591" y="882370"/>
+            <a:ext cx="1511567" cy="1963745"/>
+            <a:chOff x="5837828" y="991134"/>
+            <a:chExt cx="2098224" cy="2725898"/>
+          </a:xfrm>
+        </p:grpSpPr>
+        <p:pic>
+          <p:nvPicPr>
+            <p:cNvPr id="28" name="Picture 4"/>
+            <p:cNvPicPr>
+              <a:picLocks noChangeAspect="1" noChangeArrowheads="1"/>
+            </p:cNvPicPr>
+            <p:nvPr/>
+          </p:nvPicPr>
+          <p:blipFill>
+            <a:blip r:embed="rId2">
+              <a:extLst>
+                <a:ext uri="{28A0092B-C50C-407E-A947-70E740481C1C}">
+                  <a14:useLocalDpi xmlns:a14="http://schemas.microsoft.com/office/drawing/2010/main" val="0"/>
+                </a:ext>
+              </a:extLst>
+            </a:blip>
+            <a:srcRect/>
+            <a:stretch>
+              <a:fillRect/>
+            </a:stretch>
+          </p:blipFill>
+          <p:spPr bwMode="auto">
+            <a:xfrm>
+              <a:off x="5837828" y="991134"/>
+              <a:ext cx="2098224" cy="2725898"/>
+            </a:xfrm>
+            <a:prstGeom prst="rect">
+              <a:avLst/>
+            </a:prstGeom>
+            <a:ln>
+              <a:noFill/>
+            </a:ln>
+            <a:effectLst>
+              <a:outerShdw blurRad="292100" dist="139700" dir="2700000" algn="tl" rotWithShape="0">
+                <a:srgbClr val="333333">
+                  <a:alpha val="65000"/>
+                </a:srgbClr>
+              </a:outerShdw>
+            </a:effectLst>
+            <a:extLst>
+              <a:ext uri="{909E8E84-426E-40DD-AFC4-6F175D3DCCD1}">
+                <a14:hiddenFill xmlns:a14="http://schemas.microsoft.com/office/drawing/2010/main">
+                  <a:solidFill>
+                    <a:schemeClr val="accent1"/>
+                  </a:solidFill>
+                </a14:hiddenFill>
+              </a:ext>
+              <a:ext uri="{91240B29-F687-4F45-9708-019B960494DF}">
+                <a14:hiddenLine xmlns:a14="http://schemas.microsoft.com/office/drawing/2010/main" w="9525">
+                  <a:solidFill>
+                    <a:schemeClr val="tx1"/>
+                  </a:solidFill>
+                  <a:miter lim="800000"/>
+                  <a:headEnd/>
+                  <a:tailEnd/>
+                </a14:hiddenLine>
+              </a:ext>
+            </a:extLst>
+          </p:spPr>
+        </p:pic>
+        <p:sp>
+          <p:nvSpPr>
+            <p:cNvPr id="48" name="Rectangle 47"/>
+            <p:cNvSpPr/>
+            <p:nvPr/>
+          </p:nvSpPr>
+          <p:spPr>
+            <a:xfrm>
+              <a:off x="6617144" y="993518"/>
+              <a:ext cx="1318908" cy="1091135"/>
+            </a:xfrm>
+            <a:prstGeom prst="rect">
+              <a:avLst/>
+            </a:prstGeom>
+            <a:solidFill>
+              <a:srgbClr val="E6B9B8">
+                <a:alpha val="54902"/>
+              </a:srgbClr>
+            </a:solidFill>
+            <a:ln>
+              <a:noFill/>
+            </a:ln>
+          </p:spPr>
+          <p:style>
+            <a:lnRef idx="2">
+              <a:schemeClr val="accent1">
+                <a:shade val="50000"/>
+              </a:schemeClr>
+            </a:lnRef>
+            <a:fillRef idx="1">
+              <a:schemeClr val="accent1"/>
+            </a:fillRef>
+            <a:effectRef idx="0">
+              <a:schemeClr val="accent1"/>
+            </a:effectRef>
+            <a:fontRef idx="minor">
+              <a:schemeClr val="lt1"/>
+            </a:fontRef>
+          </p:style>
+          <p:txBody>
+            <a:bodyPr rtlCol="0" anchor="ctr"/>
+            <a:lstStyle/>
+            <a:p>
+              <a:pPr algn="ctr"/>
+              <a:endParaRPr lang="en-US"/>
+            </a:p>
+          </p:txBody>
+        </p:sp>
+        <p:pic>
+          <p:nvPicPr>
+            <p:cNvPr id="32" name="Picture 2" descr="C:\Project\detfederepo\unity\Assets\Sprites\Enemies\Alien.png"/>
+            <p:cNvPicPr>
+              <a:picLocks noChangeAspect="1" noChangeArrowheads="1"/>
+            </p:cNvPicPr>
+            <p:nvPr/>
+          </p:nvPicPr>
+          <p:blipFill>
+            <a:blip r:embed="rId5">
+              <a:extLst>
+                <a:ext uri="{28A0092B-C50C-407E-A947-70E740481C1C}">
+                  <a14:useLocalDpi xmlns:a14="http://schemas.microsoft.com/office/drawing/2010/main" val="0"/>
+                </a:ext>
+              </a:extLst>
+            </a:blip>
+            <a:srcRect/>
+            <a:stretch>
+              <a:fillRect/>
+            </a:stretch>
+          </p:blipFill>
+          <p:spPr bwMode="auto">
+            <a:xfrm rot="19449815">
+              <a:off x="6642996" y="2248268"/>
+              <a:ext cx="487888" cy="487888"/>
+            </a:xfrm>
+            <a:prstGeom prst="rect">
+              <a:avLst/>
+            </a:prstGeom>
+            <a:noFill/>
+            <a:extLst>
+              <a:ext uri="{909E8E84-426E-40DD-AFC4-6F175D3DCCD1}">
+                <a14:hiddenFill xmlns:a14="http://schemas.microsoft.com/office/drawing/2010/main">
+                  <a:solidFill>
+                    <a:srgbClr val="FFFFFF"/>
+                  </a:solidFill>
+                </a14:hiddenFill>
+              </a:ext>
+            </a:extLst>
+          </p:spPr>
+        </p:pic>
+        <p:pic>
+          <p:nvPicPr>
+            <p:cNvPr id="33" name="Picture 9" descr="C:\Users\AndersBender\AppData\Roaming\Skype\andersbender\media_messaging\media_cache\^3F60A93F08DDE063B5063BCBD834C97195A7C57F02DC6FBA14^pimgpsh_fullsize_distr.jpg"/>
+            <p:cNvPicPr>
+              <a:picLocks noChangeAspect="1" noChangeArrowheads="1"/>
+            </p:cNvPicPr>
+            <p:nvPr/>
+          </p:nvPicPr>
+          <p:blipFill>
+            <a:blip r:embed="rId3">
+              <a:extLst>
+                <a:ext uri="{BEBA8EAE-BF5A-486C-A8C5-ECC9F3942E4B}">
+                  <a14:imgProps xmlns:a14="http://schemas.microsoft.com/office/drawing/2010/main">
+                    <a14:imgLayer r:embed="rId4">
+                      <a14:imgEffect>
+                        <a14:backgroundRemoval t="7407" b="88889" l="5634" r="91549">
+                          <a14:foregroundMark x1="35211" y1="50000" x2="35211" y2="50000"/>
+                          <a14:foregroundMark x1="49296" y1="33333" x2="7042" y2="75926"/>
+                          <a14:foregroundMark x1="76056" y1="46296" x2="91549" y2="75926"/>
+                          <a14:foregroundMark x1="22535" y1="77778" x2="73239" y2="81481"/>
+                        </a14:backgroundRemoval>
+                      </a14:imgEffect>
+                    </a14:imgLayer>
+                  </a14:imgProps>
+                </a:ext>
+                <a:ext uri="{28A0092B-C50C-407E-A947-70E740481C1C}">
+                  <a14:useLocalDpi xmlns:a14="http://schemas.microsoft.com/office/drawing/2010/main" val="0"/>
+                </a:ext>
+              </a:extLst>
+            </a:blip>
+            <a:srcRect/>
+            <a:stretch>
+              <a:fillRect/>
+            </a:stretch>
+          </p:blipFill>
+          <p:spPr bwMode="auto">
+            <a:xfrm rot="20032071">
+              <a:off x="7415153" y="1149441"/>
+              <a:ext cx="493881" cy="375627"/>
+            </a:xfrm>
+            <a:prstGeom prst="rect">
+              <a:avLst/>
+            </a:prstGeom>
+            <a:noFill/>
+            <a:extLst>
+              <a:ext uri="{909E8E84-426E-40DD-AFC4-6F175D3DCCD1}">
+                <a14:hiddenFill xmlns:a14="http://schemas.microsoft.com/office/drawing/2010/main">
+                  <a:solidFill>
+                    <a:srgbClr val="FFFFFF"/>
+                  </a:solidFill>
+                </a14:hiddenFill>
+              </a:ext>
+            </a:extLst>
+          </p:spPr>
+        </p:pic>
+        <p:cxnSp>
+          <p:nvCxnSpPr>
+            <p:cNvPr id="41" name="Straight Connector 40"/>
+            <p:cNvCxnSpPr/>
+            <p:nvPr/>
+          </p:nvCxnSpPr>
+          <p:spPr>
+            <a:xfrm flipH="1" flipV="1">
+              <a:off x="6630229" y="2094525"/>
+              <a:ext cx="143703" cy="273133"/>
+            </a:xfrm>
+            <a:prstGeom prst="line">
+              <a:avLst/>
+            </a:prstGeom>
+            <a:ln w="38100">
+              <a:solidFill>
+                <a:srgbClr val="FFFF00"/>
+              </a:solidFill>
+              <a:prstDash val="sysDash"/>
+            </a:ln>
+          </p:spPr>
+          <p:style>
+            <a:lnRef idx="1">
+              <a:schemeClr val="accent1"/>
+            </a:lnRef>
+            <a:fillRef idx="0">
+              <a:schemeClr val="accent1"/>
+            </a:fillRef>
+            <a:effectRef idx="0">
+              <a:schemeClr val="accent1"/>
+            </a:effectRef>
+            <a:fontRef idx="minor">
+              <a:schemeClr val="tx1"/>
+            </a:fontRef>
+          </p:style>
+        </p:cxnSp>
+        <p:cxnSp>
+          <p:nvCxnSpPr>
+            <p:cNvPr id="43" name="Straight Connector 42"/>
+            <p:cNvCxnSpPr/>
+            <p:nvPr/>
+          </p:nvCxnSpPr>
+          <p:spPr>
+            <a:xfrm flipH="1">
+              <a:off x="6630229" y="1459196"/>
+              <a:ext cx="884712" cy="635329"/>
+            </a:xfrm>
+            <a:prstGeom prst="line">
+              <a:avLst/>
+            </a:prstGeom>
+            <a:ln w="38100">
+              <a:solidFill>
+                <a:srgbClr val="FFFF00"/>
+              </a:solidFill>
+              <a:prstDash val="sysDash"/>
+            </a:ln>
+          </p:spPr>
+          <p:style>
+            <a:lnRef idx="1">
+              <a:schemeClr val="accent1"/>
+            </a:lnRef>
+            <a:fillRef idx="0">
+              <a:schemeClr val="accent1"/>
+            </a:fillRef>
+            <a:effectRef idx="0">
+              <a:schemeClr val="accent1"/>
+            </a:effectRef>
+            <a:fontRef idx="minor">
+              <a:schemeClr val="tx1"/>
+            </a:fontRef>
+          </p:style>
+        </p:cxnSp>
+      </p:grpSp>
+      <p:grpSp>
+        <p:nvGrpSpPr>
+          <p:cNvPr id="2054" name="Group 2053"/>
+          <p:cNvGrpSpPr/>
+          <p:nvPr/>
+        </p:nvGrpSpPr>
+        <p:grpSpPr>
+          <a:xfrm>
+            <a:off x="2629877" y="882371"/>
+            <a:ext cx="1511567" cy="1971242"/>
+            <a:chOff x="3203848" y="980728"/>
+            <a:chExt cx="2098224" cy="2736304"/>
+          </a:xfrm>
+        </p:grpSpPr>
+        <p:pic>
+          <p:nvPicPr>
+            <p:cNvPr id="27" name="Picture 4"/>
+            <p:cNvPicPr>
+              <a:picLocks noChangeAspect="1" noChangeArrowheads="1"/>
+            </p:cNvPicPr>
+            <p:nvPr/>
+          </p:nvPicPr>
+          <p:blipFill>
+            <a:blip r:embed="rId2">
+              <a:extLst>
+                <a:ext uri="{28A0092B-C50C-407E-A947-70E740481C1C}">
+                  <a14:useLocalDpi xmlns:a14="http://schemas.microsoft.com/office/drawing/2010/main" val="0"/>
+                </a:ext>
+              </a:extLst>
+            </a:blip>
+            <a:srcRect/>
+            <a:stretch>
+              <a:fillRect/>
+            </a:stretch>
+          </p:blipFill>
+          <p:spPr bwMode="auto">
+            <a:xfrm>
+              <a:off x="3203848" y="980728"/>
+              <a:ext cx="2098224" cy="2725898"/>
+            </a:xfrm>
+            <a:prstGeom prst="rect">
+              <a:avLst/>
+            </a:prstGeom>
+            <a:ln>
+              <a:noFill/>
+            </a:ln>
+            <a:effectLst>
+              <a:outerShdw blurRad="292100" dist="139700" dir="2700000" algn="tl" rotWithShape="0">
+                <a:srgbClr val="333333">
+                  <a:alpha val="65000"/>
+                </a:srgbClr>
+              </a:outerShdw>
+            </a:effectLst>
+            <a:extLst>
+              <a:ext uri="{909E8E84-426E-40DD-AFC4-6F175D3DCCD1}">
+                <a14:hiddenFill xmlns:a14="http://schemas.microsoft.com/office/drawing/2010/main">
+                  <a:solidFill>
+                    <a:schemeClr val="accent1"/>
+                  </a:solidFill>
+                </a14:hiddenFill>
+              </a:ext>
+              <a:ext uri="{91240B29-F687-4F45-9708-019B960494DF}">
+                <a14:hiddenLine xmlns:a14="http://schemas.microsoft.com/office/drawing/2010/main" w="9525">
+                  <a:solidFill>
+                    <a:schemeClr val="tx1"/>
+                  </a:solidFill>
+                  <a:miter lim="800000"/>
+                  <a:headEnd/>
+                  <a:tailEnd/>
+                </a14:hiddenLine>
+              </a:ext>
+            </a:extLst>
+          </p:spPr>
+        </p:pic>
+        <p:sp>
+          <p:nvSpPr>
+            <p:cNvPr id="47" name="Rectangle 46"/>
+            <p:cNvSpPr/>
+            <p:nvPr/>
+          </p:nvSpPr>
+          <p:spPr>
+            <a:xfrm>
+              <a:off x="3203848" y="2094525"/>
+              <a:ext cx="2098224" cy="1622507"/>
+            </a:xfrm>
+            <a:prstGeom prst="rect">
+              <a:avLst/>
+            </a:prstGeom>
+            <a:solidFill>
+              <a:srgbClr val="E6B9B8">
+                <a:alpha val="54902"/>
+              </a:srgbClr>
+            </a:solidFill>
+            <a:ln>
+              <a:noFill/>
+            </a:ln>
+          </p:spPr>
+          <p:style>
+            <a:lnRef idx="2">
+              <a:schemeClr val="accent1">
+                <a:shade val="50000"/>
+              </a:schemeClr>
+            </a:lnRef>
+            <a:fillRef idx="1">
+              <a:schemeClr val="accent1"/>
+            </a:fillRef>
+            <a:effectRef idx="0">
+              <a:schemeClr val="accent1"/>
+            </a:effectRef>
+            <a:fontRef idx="minor">
+              <a:schemeClr val="lt1"/>
+            </a:fontRef>
+          </p:style>
+          <p:txBody>
+            <a:bodyPr rtlCol="0" anchor="ctr"/>
+            <a:lstStyle/>
+            <a:p>
+              <a:pPr algn="ctr"/>
+              <a:endParaRPr lang="en-US"/>
+            </a:p>
+          </p:txBody>
+        </p:sp>
+        <p:pic>
+          <p:nvPicPr>
+            <p:cNvPr id="31" name="Picture 2" descr="C:\Project\detfederepo\unity\Assets\Sprites\Enemies\Alien.png"/>
+            <p:cNvPicPr>
+              <a:picLocks noChangeAspect="1" noChangeArrowheads="1"/>
+            </p:cNvPicPr>
+            <p:nvPr/>
+          </p:nvPicPr>
+          <p:blipFill>
+            <a:blip r:embed="rId5">
+              <a:extLst>
+                <a:ext uri="{28A0092B-C50C-407E-A947-70E740481C1C}">
+                  <a14:useLocalDpi xmlns:a14="http://schemas.microsoft.com/office/drawing/2010/main" val="0"/>
+                </a:ext>
+              </a:extLst>
+            </a:blip>
+            <a:srcRect/>
+            <a:stretch>
+              <a:fillRect/>
+            </a:stretch>
+          </p:blipFill>
+          <p:spPr bwMode="auto">
+            <a:xfrm rot="1702435">
+              <a:off x="4102451" y="2540869"/>
+              <a:ext cx="487888" cy="487888"/>
+            </a:xfrm>
+            <a:prstGeom prst="rect">
+              <a:avLst/>
+            </a:prstGeom>
+            <a:noFill/>
+            <a:extLst>
+              <a:ext uri="{909E8E84-426E-40DD-AFC4-6F175D3DCCD1}">
+                <a14:hiddenFill xmlns:a14="http://schemas.microsoft.com/office/drawing/2010/main">
+                  <a:solidFill>
+                    <a:srgbClr val="FFFFFF"/>
+                  </a:solidFill>
+                </a14:hiddenFill>
+              </a:ext>
+            </a:extLst>
+          </p:spPr>
+        </p:pic>
+        <p:cxnSp>
+          <p:nvCxnSpPr>
+            <p:cNvPr id="36" name="Straight Connector 35"/>
+            <p:cNvCxnSpPr/>
+            <p:nvPr/>
+          </p:nvCxnSpPr>
+          <p:spPr>
+            <a:xfrm flipV="1">
+              <a:off x="4429496" y="2357252"/>
+              <a:ext cx="261257" cy="308758"/>
+            </a:xfrm>
+            <a:prstGeom prst="line">
+              <a:avLst/>
+            </a:prstGeom>
+            <a:ln w="38100">
+              <a:solidFill>
+                <a:srgbClr val="FFFF00"/>
+              </a:solidFill>
+              <a:prstDash val="sysDash"/>
+            </a:ln>
+          </p:spPr>
+          <p:style>
+            <a:lnRef idx="1">
+              <a:schemeClr val="accent1"/>
+            </a:lnRef>
+            <a:fillRef idx="0">
+              <a:schemeClr val="accent1"/>
+            </a:fillRef>
+            <a:effectRef idx="0">
+              <a:schemeClr val="accent1"/>
+            </a:effectRef>
+            <a:fontRef idx="minor">
+              <a:schemeClr val="tx1"/>
+            </a:fontRef>
+          </p:style>
+        </p:cxnSp>
+        <p:sp>
+          <p:nvSpPr>
+            <p:cNvPr id="49" name="Rectangle 48"/>
+            <p:cNvSpPr/>
+            <p:nvPr/>
+          </p:nvSpPr>
+          <p:spPr>
+            <a:xfrm>
+              <a:off x="3974733" y="983112"/>
+              <a:ext cx="1326673" cy="1077736"/>
+            </a:xfrm>
+            <a:prstGeom prst="rect">
+              <a:avLst/>
+            </a:prstGeom>
+            <a:solidFill>
+              <a:srgbClr val="E6B9B8">
+                <a:alpha val="54902"/>
+              </a:srgbClr>
+            </a:solidFill>
+            <a:ln>
+              <a:noFill/>
+            </a:ln>
+          </p:spPr>
+          <p:style>
+            <a:lnRef idx="2">
+              <a:schemeClr val="accent1">
+                <a:shade val="50000"/>
+              </a:schemeClr>
+            </a:lnRef>
+            <a:fillRef idx="1">
+              <a:schemeClr val="accent1"/>
+            </a:fillRef>
+            <a:effectRef idx="0">
+              <a:schemeClr val="accent1"/>
+            </a:effectRef>
+            <a:fontRef idx="minor">
+              <a:schemeClr val="lt1"/>
+            </a:fontRef>
+          </p:style>
+          <p:txBody>
+            <a:bodyPr rtlCol="0" anchor="ctr"/>
+            <a:lstStyle/>
+            <a:p>
+              <a:pPr algn="ctr"/>
+              <a:endParaRPr lang="en-US"/>
+            </a:p>
+          </p:txBody>
+        </p:sp>
+        <p:pic>
+          <p:nvPicPr>
+            <p:cNvPr id="29" name="Picture 9" descr="C:\Users\AndersBender\AppData\Roaming\Skype\andersbender\media_messaging\media_cache\^3F60A93F08DDE063B5063BCBD834C97195A7C57F02DC6FBA14^pimgpsh_fullsize_distr.jpg"/>
+            <p:cNvPicPr>
+              <a:picLocks noChangeAspect="1" noChangeArrowheads="1"/>
+            </p:cNvPicPr>
+            <p:nvPr/>
+          </p:nvPicPr>
+          <p:blipFill>
+            <a:blip r:embed="rId3">
+              <a:extLst>
+                <a:ext uri="{BEBA8EAE-BF5A-486C-A8C5-ECC9F3942E4B}">
+                  <a14:imgProps xmlns:a14="http://schemas.microsoft.com/office/drawing/2010/main">
+                    <a14:imgLayer r:embed="rId4">
+                      <a14:imgEffect>
+                        <a14:backgroundRemoval t="7407" b="88889" l="5634" r="91549">
+                          <a14:foregroundMark x1="35211" y1="50000" x2="35211" y2="50000"/>
+                          <a14:foregroundMark x1="49296" y1="33333" x2="7042" y2="75926"/>
+                          <a14:foregroundMark x1="76056" y1="46296" x2="91549" y2="75926"/>
+                          <a14:foregroundMark x1="22535" y1="77778" x2="73239" y2="81481"/>
+                        </a14:backgroundRemoval>
+                      </a14:imgEffect>
+                    </a14:imgLayer>
+                  </a14:imgProps>
+                </a:ext>
+                <a:ext uri="{28A0092B-C50C-407E-A947-70E740481C1C}">
+                  <a14:useLocalDpi xmlns:a14="http://schemas.microsoft.com/office/drawing/2010/main" val="0"/>
+                </a:ext>
+              </a:extLst>
+            </a:blip>
+            <a:srcRect/>
+            <a:stretch>
+              <a:fillRect/>
+            </a:stretch>
+          </p:blipFill>
+          <p:spPr bwMode="auto">
+            <a:xfrm rot="16522242">
+              <a:off x="4504517" y="1963428"/>
+              <a:ext cx="493881" cy="375627"/>
+            </a:xfrm>
+            <a:prstGeom prst="rect">
+              <a:avLst/>
+            </a:prstGeom>
+            <a:noFill/>
+            <a:extLst>
+              <a:ext uri="{909E8E84-426E-40DD-AFC4-6F175D3DCCD1}">
+                <a14:hiddenFill xmlns:a14="http://schemas.microsoft.com/office/drawing/2010/main">
+                  <a:solidFill>
+                    <a:srgbClr val="FFFFFF"/>
+                  </a:solidFill>
+                </a14:hiddenFill>
+              </a:ext>
+            </a:extLst>
+          </p:spPr>
+        </p:pic>
+      </p:grpSp>
+      <p:grpSp>
+        <p:nvGrpSpPr>
+          <p:cNvPr id="53" name="Group 52"/>
+          <p:cNvGrpSpPr/>
+          <p:nvPr/>
+        </p:nvGrpSpPr>
+        <p:grpSpPr>
+          <a:xfrm>
+            <a:off x="805945" y="3380825"/>
+            <a:ext cx="1511568" cy="1971242"/>
+            <a:chOff x="601568" y="980728"/>
+            <a:chExt cx="2098225" cy="2736304"/>
+          </a:xfrm>
+        </p:grpSpPr>
+        <p:pic>
+          <p:nvPicPr>
+            <p:cNvPr id="54" name="Picture 4"/>
+            <p:cNvPicPr>
+              <a:picLocks noChangeAspect="1" noChangeArrowheads="1"/>
+            </p:cNvPicPr>
+            <p:nvPr/>
+          </p:nvPicPr>
+          <p:blipFill>
+            <a:blip r:embed="rId2">
+              <a:extLst>
+                <a:ext uri="{28A0092B-C50C-407E-A947-70E740481C1C}">
+                  <a14:useLocalDpi xmlns:a14="http://schemas.microsoft.com/office/drawing/2010/main" val="0"/>
+                </a:ext>
+              </a:extLst>
+            </a:blip>
+            <a:srcRect/>
+            <a:stretch>
+              <a:fillRect/>
+            </a:stretch>
+          </p:blipFill>
+          <p:spPr bwMode="auto">
+            <a:xfrm>
+              <a:off x="601568" y="980728"/>
+              <a:ext cx="2098224" cy="2725898"/>
+            </a:xfrm>
+            <a:prstGeom prst="rect">
+              <a:avLst/>
+            </a:prstGeom>
+            <a:ln>
+              <a:noFill/>
+            </a:ln>
+            <a:effectLst>
+              <a:outerShdw blurRad="292100" dist="139700" dir="2700000" algn="tl" rotWithShape="0">
+                <a:srgbClr val="333333">
+                  <a:alpha val="65000"/>
+                </a:srgbClr>
+              </a:outerShdw>
+            </a:effectLst>
+            <a:extLst>
+              <a:ext uri="{909E8E84-426E-40DD-AFC4-6F175D3DCCD1}">
+                <a14:hiddenFill xmlns:a14="http://schemas.microsoft.com/office/drawing/2010/main">
+                  <a:solidFill>
+                    <a:schemeClr val="accent1"/>
+                  </a:solidFill>
+                </a14:hiddenFill>
+              </a:ext>
+              <a:ext uri="{91240B29-F687-4F45-9708-019B960494DF}">
+                <a14:hiddenLine xmlns:a14="http://schemas.microsoft.com/office/drawing/2010/main" w="9525">
+                  <a:solidFill>
+                    <a:schemeClr val="tx1"/>
+                  </a:solidFill>
+                  <a:miter lim="800000"/>
+                  <a:headEnd/>
+                  <a:tailEnd/>
+                </a14:hiddenLine>
+              </a:ext>
+            </a:extLst>
+          </p:spPr>
+        </p:pic>
+        <p:sp>
+          <p:nvSpPr>
+            <p:cNvPr id="55" name="Rectangle 54"/>
+            <p:cNvSpPr/>
+            <p:nvPr/>
+          </p:nvSpPr>
+          <p:spPr>
+            <a:xfrm>
+              <a:off x="601569" y="2094525"/>
+              <a:ext cx="2098224" cy="1622507"/>
+            </a:xfrm>
+            <a:prstGeom prst="rect">
+              <a:avLst/>
+            </a:prstGeom>
+            <a:solidFill>
+              <a:srgbClr val="E6B9B8">
+                <a:alpha val="54902"/>
+              </a:srgbClr>
+            </a:solidFill>
+            <a:ln>
+              <a:noFill/>
+            </a:ln>
+          </p:spPr>
+          <p:style>
+            <a:lnRef idx="2">
+              <a:schemeClr val="accent1">
+                <a:shade val="50000"/>
+              </a:schemeClr>
+            </a:lnRef>
+            <a:fillRef idx="1">
+              <a:schemeClr val="accent1"/>
+            </a:fillRef>
+            <a:effectRef idx="0">
+              <a:schemeClr val="accent1"/>
+            </a:effectRef>
+            <a:fontRef idx="minor">
+              <a:schemeClr val="lt1"/>
+            </a:fontRef>
+          </p:style>
+          <p:txBody>
+            <a:bodyPr rtlCol="0" anchor="ctr"/>
+            <a:lstStyle/>
+            <a:p>
+              <a:pPr algn="ctr"/>
+              <a:endParaRPr lang="en-US"/>
+            </a:p>
+          </p:txBody>
+        </p:sp>
+        <p:pic>
+          <p:nvPicPr>
+            <p:cNvPr id="56" name="Picture 9" descr="C:\Users\AndersBender\AppData\Roaming\Skype\andersbender\media_messaging\media_cache\^3F60A93F08DDE063B5063BCBD834C97195A7C57F02DC6FBA14^pimgpsh_fullsize_distr.jpg"/>
+            <p:cNvPicPr>
+              <a:picLocks noChangeAspect="1" noChangeArrowheads="1"/>
+            </p:cNvPicPr>
+            <p:nvPr/>
+          </p:nvPicPr>
+          <p:blipFill>
+            <a:blip r:embed="rId3">
+              <a:extLst>
+                <a:ext uri="{BEBA8EAE-BF5A-486C-A8C5-ECC9F3942E4B}">
+                  <a14:imgProps xmlns:a14="http://schemas.microsoft.com/office/drawing/2010/main">
+                    <a14:imgLayer r:embed="rId4">
+                      <a14:imgEffect>
+                        <a14:backgroundRemoval t="7407" b="88889" l="5634" r="91549">
+                          <a14:foregroundMark x1="35211" y1="50000" x2="35211" y2="50000"/>
+                          <a14:foregroundMark x1="49296" y1="33333" x2="7042" y2="75926"/>
+                          <a14:foregroundMark x1="76056" y1="46296" x2="91549" y2="75926"/>
+                          <a14:foregroundMark x1="22535" y1="77778" x2="73239" y2="81481"/>
+                        </a14:backgroundRemoval>
+                      </a14:imgEffect>
+                    </a14:imgLayer>
+                  </a14:imgProps>
+                </a:ext>
+                <a:ext uri="{28A0092B-C50C-407E-A947-70E740481C1C}">
+                  <a14:useLocalDpi xmlns:a14="http://schemas.microsoft.com/office/drawing/2010/main" val="0"/>
+                </a:ext>
+              </a:extLst>
+            </a:blip>
+            <a:srcRect/>
+            <a:stretch>
+              <a:fillRect/>
+            </a:stretch>
+          </p:blipFill>
+          <p:spPr bwMode="auto">
+            <a:xfrm rot="19179872">
+              <a:off x="1848178" y="2458863"/>
+              <a:ext cx="493881" cy="375627"/>
+            </a:xfrm>
+            <a:prstGeom prst="rect">
+              <a:avLst/>
+            </a:prstGeom>
+            <a:noFill/>
+            <a:extLst>
+              <a:ext uri="{909E8E84-426E-40DD-AFC4-6F175D3DCCD1}">
+                <a14:hiddenFill xmlns:a14="http://schemas.microsoft.com/office/drawing/2010/main">
+                  <a:solidFill>
+                    <a:srgbClr val="FFFFFF"/>
+                  </a:solidFill>
+                </a14:hiddenFill>
+              </a:ext>
+            </a:extLst>
+          </p:spPr>
+        </p:pic>
+        <p:pic>
+          <p:nvPicPr>
+            <p:cNvPr id="57" name="Picture 2" descr="C:\Project\detfederepo\unity\Assets\Sprites\Enemies\Alien.png"/>
+            <p:cNvPicPr>
+              <a:picLocks noChangeAspect="1" noChangeArrowheads="1"/>
+            </p:cNvPicPr>
+            <p:nvPr/>
+          </p:nvPicPr>
+          <p:blipFill>
+            <a:blip r:embed="rId5">
+              <a:extLst>
+                <a:ext uri="{28A0092B-C50C-407E-A947-70E740481C1C}">
+                  <a14:useLocalDpi xmlns:a14="http://schemas.microsoft.com/office/drawing/2010/main" val="0"/>
+                </a:ext>
+              </a:extLst>
+            </a:blip>
+            <a:srcRect/>
+            <a:stretch>
+              <a:fillRect/>
+            </a:stretch>
+          </p:blipFill>
+          <p:spPr bwMode="auto">
+            <a:xfrm rot="3865126">
+              <a:off x="1081373" y="2975177"/>
+              <a:ext cx="487888" cy="487888"/>
+            </a:xfrm>
+            <a:prstGeom prst="rect">
+              <a:avLst/>
+            </a:prstGeom>
+            <a:noFill/>
+            <a:extLst>
+              <a:ext uri="{909E8E84-426E-40DD-AFC4-6F175D3DCCD1}">
+                <a14:hiddenFill xmlns:a14="http://schemas.microsoft.com/office/drawing/2010/main">
+                  <a:solidFill>
+                    <a:srgbClr val="FFFFFF"/>
+                  </a:solidFill>
+                </a14:hiddenFill>
+              </a:ext>
+            </a:extLst>
+          </p:spPr>
+        </p:pic>
+        <p:cxnSp>
+          <p:nvCxnSpPr>
+            <p:cNvPr id="58" name="Straight Connector 57"/>
+            <p:cNvCxnSpPr/>
+            <p:nvPr/>
+          </p:nvCxnSpPr>
+          <p:spPr>
+            <a:xfrm flipV="1">
+              <a:off x="1475656" y="2784813"/>
+              <a:ext cx="475907" cy="370137"/>
+            </a:xfrm>
+            <a:prstGeom prst="line">
+              <a:avLst/>
+            </a:prstGeom>
+            <a:ln w="38100">
+              <a:solidFill>
+                <a:srgbClr val="FFFF00"/>
+              </a:solidFill>
+              <a:prstDash val="sysDash"/>
+            </a:ln>
+          </p:spPr>
+          <p:style>
+            <a:lnRef idx="1">
+              <a:schemeClr val="accent1"/>
+            </a:lnRef>
+            <a:fillRef idx="0">
+              <a:schemeClr val="accent1"/>
+            </a:fillRef>
+            <a:effectRef idx="0">
+              <a:schemeClr val="accent1"/>
+            </a:effectRef>
+            <a:fontRef idx="minor">
+              <a:schemeClr val="tx1"/>
+            </a:fontRef>
+          </p:style>
+        </p:cxnSp>
+      </p:grpSp>
+      <p:pic>
+        <p:nvPicPr>
+          <p:cNvPr id="60" name="Picture 4"/>
+          <p:cNvPicPr>
+            <a:picLocks noChangeAspect="1" noChangeArrowheads="1"/>
+          </p:cNvPicPr>
+          <p:nvPr/>
+        </p:nvPicPr>
+        <p:blipFill>
+          <a:blip r:embed="rId2">
+            <a:extLst>
+              <a:ext uri="{28A0092B-C50C-407E-A947-70E740481C1C}">
+                <a14:useLocalDpi xmlns:a14="http://schemas.microsoft.com/office/drawing/2010/main" val="0"/>
+              </a:ext>
+            </a:extLst>
+          </a:blip>
+          <a:srcRect/>
+          <a:stretch>
+            <a:fillRect/>
+          </a:stretch>
+        </p:blipFill>
+        <p:spPr bwMode="auto">
+          <a:xfrm>
+            <a:off x="4500590" y="3393993"/>
+            <a:ext cx="1511567" cy="1963745"/>
+          </a:xfrm>
+          <a:prstGeom prst="rect">
+            <a:avLst/>
+          </a:prstGeom>
+          <a:ln>
+            <a:noFill/>
+          </a:ln>
+          <a:effectLst>
+            <a:outerShdw blurRad="292100" dist="139700" dir="2700000" algn="tl" rotWithShape="0">
+              <a:srgbClr val="333333">
+                <a:alpha val="65000"/>
+              </a:srgbClr>
+            </a:outerShdw>
+          </a:effectLst>
+          <a:extLst>
+            <a:ext uri="{909E8E84-426E-40DD-AFC4-6F175D3DCCD1}">
+              <a14:hiddenFill xmlns:a14="http://schemas.microsoft.com/office/drawing/2010/main">
+                <a:solidFill>
+                  <a:schemeClr val="accent1"/>
+                </a:solidFill>
+              </a14:hiddenFill>
+            </a:ext>
+            <a:ext uri="{91240B29-F687-4F45-9708-019B960494DF}">
+              <a14:hiddenLine xmlns:a14="http://schemas.microsoft.com/office/drawing/2010/main" w="9525">
+                <a:solidFill>
+                  <a:schemeClr val="tx1"/>
+                </a:solidFill>
+                <a:miter lim="800000"/>
+                <a:headEnd/>
+                <a:tailEnd/>
+              </a14:hiddenLine>
+            </a:ext>
+          </a:extLst>
+        </p:spPr>
+      </p:pic>
+      <p:sp>
+        <p:nvSpPr>
+          <p:cNvPr id="61" name="Rectangle 60"/>
+          <p:cNvSpPr/>
+          <p:nvPr/>
+        </p:nvSpPr>
+        <p:spPr>
+          <a:xfrm>
+            <a:off x="5062012" y="3395710"/>
+            <a:ext cx="950145" cy="786057"/>
+          </a:xfrm>
+          <a:prstGeom prst="rect">
+            <a:avLst/>
+          </a:prstGeom>
+          <a:solidFill>
+            <a:srgbClr val="E6B9B8">
+              <a:alpha val="54902"/>
+            </a:srgbClr>
+          </a:solidFill>
+          <a:ln>
+            <a:noFill/>
+          </a:ln>
+        </p:spPr>
+        <p:style>
+          <a:lnRef idx="2">
+            <a:schemeClr val="accent1">
+              <a:shade val="50000"/>
+            </a:schemeClr>
+          </a:lnRef>
+          <a:fillRef idx="1">
+            <a:schemeClr val="accent1"/>
+          </a:fillRef>
+          <a:effectRef idx="0">
+            <a:schemeClr val="accent1"/>
+          </a:effectRef>
+          <a:fontRef idx="minor">
+            <a:schemeClr val="lt1"/>
+          </a:fontRef>
+        </p:style>
+        <p:txBody>
+          <a:bodyPr rtlCol="0" anchor="ctr"/>
+          <a:lstStyle/>
+          <a:p>
+            <a:pPr algn="ctr"/>
+            <a:endParaRPr lang="en-US"/>
+          </a:p>
+        </p:txBody>
+      </p:sp>
+      <p:pic>
+        <p:nvPicPr>
+          <p:cNvPr id="62" name="Picture 2" descr="C:\Project\detfederepo\unity\Assets\Sprites\Enemies\Alien.png"/>
+          <p:cNvPicPr>
+            <a:picLocks noChangeAspect="1" noChangeArrowheads="1"/>
+          </p:cNvPicPr>
+          <p:nvPr/>
+        </p:nvPicPr>
+        <p:blipFill>
+          <a:blip r:embed="rId5">
+            <a:extLst>
+              <a:ext uri="{28A0092B-C50C-407E-A947-70E740481C1C}">
+                <a14:useLocalDpi xmlns:a14="http://schemas.microsoft.com/office/drawing/2010/main" val="0"/>
+              </a:ext>
+            </a:extLst>
+          </a:blip>
+          <a:srcRect/>
+          <a:stretch>
+            <a:fillRect/>
+          </a:stretch>
+        </p:blipFill>
+        <p:spPr bwMode="auto">
+          <a:xfrm rot="1314542">
+            <a:off x="5335833" y="4335318"/>
+            <a:ext cx="351476" cy="351476"/>
+          </a:xfrm>
+          <a:prstGeom prst="rect">
+            <a:avLst/>
+          </a:prstGeom>
+          <a:noFill/>
+          <a:extLst>
+            <a:ext uri="{909E8E84-426E-40DD-AFC4-6F175D3DCCD1}">
+              <a14:hiddenFill xmlns:a14="http://schemas.microsoft.com/office/drawing/2010/main">
+                <a:solidFill>
+                  <a:srgbClr val="FFFFFF"/>
+                </a:solidFill>
+              </a14:hiddenFill>
+            </a:ext>
+          </a:extLst>
+        </p:spPr>
+      </p:pic>
+      <p:pic>
+        <p:nvPicPr>
+          <p:cNvPr id="63" name="Picture 9" descr="C:\Users\AndersBender\AppData\Roaming\Skype\andersbender\media_messaging\media_cache\^3F60A93F08DDE063B5063BCBD834C97195A7C57F02DC6FBA14^pimgpsh_fullsize_distr.jpg"/>
+          <p:cNvPicPr>
+            <a:picLocks noChangeAspect="1" noChangeArrowheads="1"/>
+          </p:cNvPicPr>
+          <p:nvPr/>
+        </p:nvPicPr>
+        <p:blipFill>
+          <a:blip r:embed="rId3">
+            <a:extLst>
+              <a:ext uri="{BEBA8EAE-BF5A-486C-A8C5-ECC9F3942E4B}">
+                <a14:imgProps xmlns:a14="http://schemas.microsoft.com/office/drawing/2010/main">
+                  <a14:imgLayer r:embed="rId4">
+                    <a14:imgEffect>
+                      <a14:backgroundRemoval t="7407" b="88889" l="5634" r="91549">
+                        <a14:foregroundMark x1="35211" y1="50000" x2="35211" y2="50000"/>
+                        <a14:foregroundMark x1="49296" y1="33333" x2="7042" y2="75926"/>
+                        <a14:foregroundMark x1="76056" y1="46296" x2="91549" y2="75926"/>
+                        <a14:foregroundMark x1="22535" y1="77778" x2="73239" y2="81481"/>
+                      </a14:backgroundRemoval>
+                    </a14:imgEffect>
+                  </a14:imgLayer>
+                </a14:imgProps>
+              </a:ext>
+              <a:ext uri="{28A0092B-C50C-407E-A947-70E740481C1C}">
+                <a14:useLocalDpi xmlns:a14="http://schemas.microsoft.com/office/drawing/2010/main" val="0"/>
+              </a:ext>
+            </a:extLst>
+          </a:blip>
+          <a:srcRect/>
+          <a:stretch>
+            <a:fillRect/>
+          </a:stretch>
+        </p:blipFill>
+        <p:spPr bwMode="auto">
+          <a:xfrm rot="20032071">
+            <a:off x="5636900" y="3508038"/>
+            <a:ext cx="355793" cy="270603"/>
+          </a:xfrm>
+          <a:prstGeom prst="rect">
+            <a:avLst/>
+          </a:prstGeom>
+          <a:noFill/>
+          <a:extLst>
+            <a:ext uri="{909E8E84-426E-40DD-AFC4-6F175D3DCCD1}">
+              <a14:hiddenFill xmlns:a14="http://schemas.microsoft.com/office/drawing/2010/main">
+                <a:solidFill>
+                  <a:srgbClr val="FFFFFF"/>
+                </a:solidFill>
+              </a14:hiddenFill>
+            </a:ext>
+          </a:extLst>
+        </p:spPr>
+      </p:pic>
+      <p:cxnSp>
+        <p:nvCxnSpPr>
+          <p:cNvPr id="65" name="Straight Connector 64"/>
+          <p:cNvCxnSpPr/>
+          <p:nvPr/>
+        </p:nvCxnSpPr>
+        <p:spPr>
+          <a:xfrm flipH="1">
+            <a:off x="5562598" y="3731186"/>
+            <a:ext cx="146191" cy="671369"/>
+          </a:xfrm>
+          <a:prstGeom prst="line">
+            <a:avLst/>
+          </a:prstGeom>
+          <a:ln w="38100">
+            <a:solidFill>
+              <a:srgbClr val="FFFF00"/>
+            </a:solidFill>
+            <a:prstDash val="sysDash"/>
+          </a:ln>
+        </p:spPr>
+        <p:style>
+          <a:lnRef idx="1">
+            <a:schemeClr val="accent1"/>
+          </a:lnRef>
+          <a:fillRef idx="0">
+            <a:schemeClr val="accent1"/>
+          </a:fillRef>
+          <a:effectRef idx="0">
+            <a:schemeClr val="accent1"/>
+          </a:effectRef>
+          <a:fontRef idx="minor">
+            <a:schemeClr val="tx1"/>
+          </a:fontRef>
+        </p:style>
+      </p:cxnSp>
+      <p:grpSp>
+        <p:nvGrpSpPr>
+          <p:cNvPr id="66" name="Group 65"/>
+          <p:cNvGrpSpPr/>
+          <p:nvPr/>
+        </p:nvGrpSpPr>
+        <p:grpSpPr>
+          <a:xfrm>
+            <a:off x="2629876" y="3393994"/>
+            <a:ext cx="1511567" cy="1971242"/>
+            <a:chOff x="3203848" y="980728"/>
+            <a:chExt cx="2098224" cy="2736304"/>
+          </a:xfrm>
+        </p:grpSpPr>
+        <p:pic>
+          <p:nvPicPr>
+            <p:cNvPr id="67" name="Picture 4"/>
+            <p:cNvPicPr>
+              <a:picLocks noChangeAspect="1" noChangeArrowheads="1"/>
+            </p:cNvPicPr>
+            <p:nvPr/>
+          </p:nvPicPr>
+          <p:blipFill>
+            <a:blip r:embed="rId2">
+              <a:extLst>
+                <a:ext uri="{28A0092B-C50C-407E-A947-70E740481C1C}">
+                  <a14:useLocalDpi xmlns:a14="http://schemas.microsoft.com/office/drawing/2010/main" val="0"/>
+                </a:ext>
+              </a:extLst>
+            </a:blip>
+            <a:srcRect/>
+            <a:stretch>
+              <a:fillRect/>
+            </a:stretch>
+          </p:blipFill>
+          <p:spPr bwMode="auto">
+            <a:xfrm>
+              <a:off x="3203848" y="980728"/>
+              <a:ext cx="2098224" cy="2725898"/>
+            </a:xfrm>
+            <a:prstGeom prst="rect">
+              <a:avLst/>
+            </a:prstGeom>
+            <a:ln>
+              <a:noFill/>
+            </a:ln>
+            <a:effectLst>
+              <a:outerShdw blurRad="292100" dist="139700" dir="2700000" algn="tl" rotWithShape="0">
+                <a:srgbClr val="333333">
+                  <a:alpha val="65000"/>
+                </a:srgbClr>
+              </a:outerShdw>
+            </a:effectLst>
+            <a:extLst>
+              <a:ext uri="{909E8E84-426E-40DD-AFC4-6F175D3DCCD1}">
+                <a14:hiddenFill xmlns:a14="http://schemas.microsoft.com/office/drawing/2010/main">
+                  <a:solidFill>
+                    <a:schemeClr val="accent1"/>
+                  </a:solidFill>
+                </a14:hiddenFill>
+              </a:ext>
+              <a:ext uri="{91240B29-F687-4F45-9708-019B960494DF}">
+                <a14:hiddenLine xmlns:a14="http://schemas.microsoft.com/office/drawing/2010/main" w="9525">
+                  <a:solidFill>
+                    <a:schemeClr val="tx1"/>
+                  </a:solidFill>
+                  <a:miter lim="800000"/>
+                  <a:headEnd/>
+                  <a:tailEnd/>
+                </a14:hiddenLine>
+              </a:ext>
+            </a:extLst>
+          </p:spPr>
+        </p:pic>
+        <p:sp>
+          <p:nvSpPr>
+            <p:cNvPr id="68" name="Rectangle 67"/>
+            <p:cNvSpPr/>
+            <p:nvPr/>
+          </p:nvSpPr>
+          <p:spPr>
+            <a:xfrm>
+              <a:off x="3203848" y="2094525"/>
+              <a:ext cx="2098224" cy="1622507"/>
+            </a:xfrm>
+            <a:prstGeom prst="rect">
+              <a:avLst/>
+            </a:prstGeom>
+            <a:solidFill>
+              <a:srgbClr val="E6B9B8">
+                <a:alpha val="54902"/>
+              </a:srgbClr>
+            </a:solidFill>
+            <a:ln>
+              <a:noFill/>
+            </a:ln>
+          </p:spPr>
+          <p:style>
+            <a:lnRef idx="2">
+              <a:schemeClr val="accent1">
+                <a:shade val="50000"/>
+              </a:schemeClr>
+            </a:lnRef>
+            <a:fillRef idx="1">
+              <a:schemeClr val="accent1"/>
+            </a:fillRef>
+            <a:effectRef idx="0">
+              <a:schemeClr val="accent1"/>
+            </a:effectRef>
+            <a:fontRef idx="minor">
+              <a:schemeClr val="lt1"/>
+            </a:fontRef>
+          </p:style>
+          <p:txBody>
+            <a:bodyPr rtlCol="0" anchor="ctr"/>
+            <a:lstStyle/>
+            <a:p>
+              <a:pPr algn="ctr"/>
+              <a:endParaRPr lang="en-US"/>
+            </a:p>
+          </p:txBody>
+        </p:sp>
+        <p:pic>
+          <p:nvPicPr>
+            <p:cNvPr id="69" name="Picture 2" descr="C:\Project\detfederepo\unity\Assets\Sprites\Enemies\Alien.png"/>
+            <p:cNvPicPr>
+              <a:picLocks noChangeAspect="1" noChangeArrowheads="1"/>
+            </p:cNvPicPr>
+            <p:nvPr/>
+          </p:nvPicPr>
+          <p:blipFill>
+            <a:blip r:embed="rId5">
+              <a:extLst>
+                <a:ext uri="{28A0092B-C50C-407E-A947-70E740481C1C}">
+                  <a14:useLocalDpi xmlns:a14="http://schemas.microsoft.com/office/drawing/2010/main" val="0"/>
+                </a:ext>
+              </a:extLst>
+            </a:blip>
+            <a:srcRect/>
+            <a:stretch>
+              <a:fillRect/>
+            </a:stretch>
+          </p:blipFill>
+          <p:spPr bwMode="auto">
+            <a:xfrm rot="1702435">
+              <a:off x="4102451" y="2540869"/>
+              <a:ext cx="487888" cy="487888"/>
+            </a:xfrm>
+            <a:prstGeom prst="rect">
+              <a:avLst/>
+            </a:prstGeom>
+            <a:noFill/>
+            <a:extLst>
+              <a:ext uri="{909E8E84-426E-40DD-AFC4-6F175D3DCCD1}">
+                <a14:hiddenFill xmlns:a14="http://schemas.microsoft.com/office/drawing/2010/main">
+                  <a:solidFill>
+                    <a:srgbClr val="FFFFFF"/>
+                  </a:solidFill>
+                </a14:hiddenFill>
+              </a:ext>
+            </a:extLst>
+          </p:spPr>
+        </p:pic>
+        <p:cxnSp>
+          <p:nvCxnSpPr>
+            <p:cNvPr id="70" name="Straight Connector 69"/>
+            <p:cNvCxnSpPr/>
+            <p:nvPr/>
+          </p:nvCxnSpPr>
+          <p:spPr>
+            <a:xfrm flipV="1">
+              <a:off x="4429496" y="2357252"/>
+              <a:ext cx="261257" cy="308758"/>
+            </a:xfrm>
+            <a:prstGeom prst="line">
+              <a:avLst/>
+            </a:prstGeom>
+            <a:ln w="38100">
+              <a:solidFill>
+                <a:srgbClr val="FFFF00"/>
+              </a:solidFill>
+              <a:prstDash val="sysDash"/>
+            </a:ln>
+          </p:spPr>
+          <p:style>
+            <a:lnRef idx="1">
+              <a:schemeClr val="accent1"/>
+            </a:lnRef>
+            <a:fillRef idx="0">
+              <a:schemeClr val="accent1"/>
+            </a:fillRef>
+            <a:effectRef idx="0">
+              <a:schemeClr val="accent1"/>
+            </a:effectRef>
+            <a:fontRef idx="minor">
+              <a:schemeClr val="tx1"/>
+            </a:fontRef>
+          </p:style>
+        </p:cxnSp>
+        <p:sp>
+          <p:nvSpPr>
+            <p:cNvPr id="71" name="Rectangle 70"/>
+            <p:cNvSpPr/>
+            <p:nvPr/>
+          </p:nvSpPr>
+          <p:spPr>
+            <a:xfrm>
+              <a:off x="3974733" y="983112"/>
+              <a:ext cx="1326673" cy="1077736"/>
+            </a:xfrm>
+            <a:prstGeom prst="rect">
+              <a:avLst/>
+            </a:prstGeom>
+            <a:solidFill>
+              <a:srgbClr val="E6B9B8">
+                <a:alpha val="54902"/>
+              </a:srgbClr>
+            </a:solidFill>
+            <a:ln>
+              <a:noFill/>
+            </a:ln>
+          </p:spPr>
+          <p:style>
+            <a:lnRef idx="2">
+              <a:schemeClr val="accent1">
+                <a:shade val="50000"/>
+              </a:schemeClr>
+            </a:lnRef>
+            <a:fillRef idx="1">
+              <a:schemeClr val="accent1"/>
+            </a:fillRef>
+            <a:effectRef idx="0">
+              <a:schemeClr val="accent1"/>
+            </a:effectRef>
+            <a:fontRef idx="minor">
+              <a:schemeClr val="lt1"/>
+            </a:fontRef>
+          </p:style>
+          <p:txBody>
+            <a:bodyPr rtlCol="0" anchor="ctr"/>
+            <a:lstStyle/>
+            <a:p>
+              <a:pPr algn="ctr"/>
+              <a:endParaRPr lang="en-US"/>
+            </a:p>
+          </p:txBody>
+        </p:sp>
+        <p:pic>
+          <p:nvPicPr>
+            <p:cNvPr id="72" name="Picture 9" descr="C:\Users\AndersBender\AppData\Roaming\Skype\andersbender\media_messaging\media_cache\^3F60A93F08DDE063B5063BCBD834C97195A7C57F02DC6FBA14^pimgpsh_fullsize_distr.jpg"/>
+            <p:cNvPicPr>
+              <a:picLocks noChangeAspect="1" noChangeArrowheads="1"/>
+            </p:cNvPicPr>
+            <p:nvPr/>
+          </p:nvPicPr>
+          <p:blipFill>
+            <a:blip r:embed="rId3">
+              <a:extLst>
+                <a:ext uri="{BEBA8EAE-BF5A-486C-A8C5-ECC9F3942E4B}">
+                  <a14:imgProps xmlns:a14="http://schemas.microsoft.com/office/drawing/2010/main">
+                    <a14:imgLayer r:embed="rId4">
+                      <a14:imgEffect>
+                        <a14:backgroundRemoval t="7407" b="88889" l="5634" r="91549">
+                          <a14:foregroundMark x1="35211" y1="50000" x2="35211" y2="50000"/>
+                          <a14:foregroundMark x1="49296" y1="33333" x2="7042" y2="75926"/>
+                          <a14:foregroundMark x1="76056" y1="46296" x2="91549" y2="75926"/>
+                          <a14:foregroundMark x1="22535" y1="77778" x2="73239" y2="81481"/>
+                        </a14:backgroundRemoval>
+                      </a14:imgEffect>
+                    </a14:imgLayer>
+                  </a14:imgProps>
+                </a:ext>
+                <a:ext uri="{28A0092B-C50C-407E-A947-70E740481C1C}">
+                  <a14:useLocalDpi xmlns:a14="http://schemas.microsoft.com/office/drawing/2010/main" val="0"/>
+                </a:ext>
+              </a:extLst>
+            </a:blip>
+            <a:srcRect/>
+            <a:stretch>
+              <a:fillRect/>
+            </a:stretch>
+          </p:blipFill>
+          <p:spPr bwMode="auto">
+            <a:xfrm rot="16522242">
+              <a:off x="4504517" y="1963428"/>
+              <a:ext cx="493881" cy="375627"/>
+            </a:xfrm>
+            <a:prstGeom prst="rect">
+              <a:avLst/>
+            </a:prstGeom>
+            <a:noFill/>
+            <a:extLst>
+              <a:ext uri="{909E8E84-426E-40DD-AFC4-6F175D3DCCD1}">
+                <a14:hiddenFill xmlns:a14="http://schemas.microsoft.com/office/drawing/2010/main">
+                  <a:solidFill>
+                    <a:srgbClr val="FFFFFF"/>
+                  </a:solidFill>
+                </a14:hiddenFill>
+              </a:ext>
+            </a:extLst>
+          </p:spPr>
+        </p:pic>
+      </p:grpSp>
+      <p:sp>
+        <p:nvSpPr>
+          <p:cNvPr id="2058" name="TextBox 2057"/>
+          <p:cNvSpPr txBox="1"/>
+          <p:nvPr/>
+        </p:nvSpPr>
+        <p:spPr>
+          <a:xfrm>
+            <a:off x="2173069" y="499870"/>
+            <a:ext cx="2559803" cy="369332"/>
+          </a:xfrm>
+          <a:prstGeom prst="rect">
+            <a:avLst/>
+          </a:prstGeom>
+          <a:noFill/>
+        </p:spPr>
+        <p:txBody>
+          <a:bodyPr wrap="none" rtlCol="0">
+            <a:spAutoFit/>
+          </a:bodyPr>
+          <a:lstStyle/>
+          <a:p>
+            <a:r>
+              <a:rPr lang="en-US" dirty="0" smtClean="0"/>
+              <a:t>Without “Hunting Mode”</a:t>
+            </a:r>
+            <a:endParaRPr lang="en-US" dirty="0"/>
+          </a:p>
+        </p:txBody>
+      </p:sp>
+      <p:sp>
+        <p:nvSpPr>
+          <p:cNvPr id="76" name="TextBox 75"/>
+          <p:cNvSpPr txBox="1"/>
+          <p:nvPr/>
+        </p:nvSpPr>
+        <p:spPr>
+          <a:xfrm>
+            <a:off x="2334358" y="3059668"/>
+            <a:ext cx="2239203" cy="369332"/>
+          </a:xfrm>
+          <a:prstGeom prst="rect">
+            <a:avLst/>
+          </a:prstGeom>
+          <a:noFill/>
+        </p:spPr>
+        <p:txBody>
+          <a:bodyPr wrap="none" rtlCol="0">
+            <a:spAutoFit/>
+          </a:bodyPr>
+          <a:lstStyle/>
+          <a:p>
+            <a:r>
+              <a:rPr lang="en-US" dirty="0" smtClean="0"/>
+              <a:t>With “Hunting Mode”</a:t>
+            </a:r>
+            <a:endParaRPr lang="en-US" dirty="0"/>
+          </a:p>
+        </p:txBody>
+      </p:sp>
+    </p:spTree>
+    <p:extLst>
+      <p:ext uri="{BB962C8B-B14F-4D97-AF65-F5344CB8AC3E}">
+        <p14:creationId xmlns:p14="http://schemas.microsoft.com/office/powerpoint/2010/main" val="1420722426"/>
+      </p:ext>
+    </p:extLst>
+  </p:cSld>
+  <p:clrMapOvr>
+    <a:masterClrMapping/>
+  </p:clrMapOvr>
+</p:sld>
+</file>
+
 <file path=ppt/theme/theme1.xml><?xml version="1.0" encoding="utf-8"?>
 <a:theme xmlns:a="http://schemas.openxmlformats.org/drawingml/2006/main" name="Kontortema">
   <a:themeElements>

</xml_diff>

<commit_message>
iterationg 3 and some last tweaks to AI
</commit_message>
<xml_diff>
--- a/figures/astar/raycast.pptx
+++ b/figures/astar/raycast.pptx
@@ -8,6 +8,7 @@
     <p:sldId id="256" r:id="rId2"/>
     <p:sldId id="257" r:id="rId3"/>
     <p:sldId id="258" r:id="rId4"/>
+    <p:sldId id="259" r:id="rId5"/>
   </p:sldIdLst>
   <p:sldSz cx="9144000" cy="6858000" type="screen4x3"/>
   <p:notesSz cx="6858000" cy="9144000"/>
@@ -290,7 +291,7 @@
           <a:p>
             <a:fld id="{EDC5A5AF-D9E8-4DD6-999F-A60663D43858}" type="datetimeFigureOut">
               <a:rPr lang="da-DK" smtClean="0"/>
-              <a:t>26-05-2015</a:t>
+              <a:t>27-05-2015</a:t>
             </a:fld>
             <a:endParaRPr lang="da-DK"/>
           </a:p>
@@ -455,7 +456,7 @@
           <a:p>
             <a:fld id="{EDC5A5AF-D9E8-4DD6-999F-A60663D43858}" type="datetimeFigureOut">
               <a:rPr lang="da-DK" smtClean="0"/>
-              <a:t>26-05-2015</a:t>
+              <a:t>27-05-2015</a:t>
             </a:fld>
             <a:endParaRPr lang="da-DK"/>
           </a:p>
@@ -630,7 +631,7 @@
           <a:p>
             <a:fld id="{EDC5A5AF-D9E8-4DD6-999F-A60663D43858}" type="datetimeFigureOut">
               <a:rPr lang="da-DK" smtClean="0"/>
-              <a:t>26-05-2015</a:t>
+              <a:t>27-05-2015</a:t>
             </a:fld>
             <a:endParaRPr lang="da-DK"/>
           </a:p>
@@ -795,7 +796,7 @@
           <a:p>
             <a:fld id="{EDC5A5AF-D9E8-4DD6-999F-A60663D43858}" type="datetimeFigureOut">
               <a:rPr lang="da-DK" smtClean="0"/>
-              <a:t>26-05-2015</a:t>
+              <a:t>27-05-2015</a:t>
             </a:fld>
             <a:endParaRPr lang="da-DK"/>
           </a:p>
@@ -1036,7 +1037,7 @@
           <a:p>
             <a:fld id="{EDC5A5AF-D9E8-4DD6-999F-A60663D43858}" type="datetimeFigureOut">
               <a:rPr lang="da-DK" smtClean="0"/>
-              <a:t>26-05-2015</a:t>
+              <a:t>27-05-2015</a:t>
             </a:fld>
             <a:endParaRPr lang="da-DK"/>
           </a:p>
@@ -1319,7 +1320,7 @@
           <a:p>
             <a:fld id="{EDC5A5AF-D9E8-4DD6-999F-A60663D43858}" type="datetimeFigureOut">
               <a:rPr lang="da-DK" smtClean="0"/>
-              <a:t>26-05-2015</a:t>
+              <a:t>27-05-2015</a:t>
             </a:fld>
             <a:endParaRPr lang="da-DK"/>
           </a:p>
@@ -1736,7 +1737,7 @@
           <a:p>
             <a:fld id="{EDC5A5AF-D9E8-4DD6-999F-A60663D43858}" type="datetimeFigureOut">
               <a:rPr lang="da-DK" smtClean="0"/>
-              <a:t>26-05-2015</a:t>
+              <a:t>27-05-2015</a:t>
             </a:fld>
             <a:endParaRPr lang="da-DK"/>
           </a:p>
@@ -1849,7 +1850,7 @@
           <a:p>
             <a:fld id="{EDC5A5AF-D9E8-4DD6-999F-A60663D43858}" type="datetimeFigureOut">
               <a:rPr lang="da-DK" smtClean="0"/>
-              <a:t>26-05-2015</a:t>
+              <a:t>27-05-2015</a:t>
             </a:fld>
             <a:endParaRPr lang="da-DK"/>
           </a:p>
@@ -1939,7 +1940,7 @@
           <a:p>
             <a:fld id="{EDC5A5AF-D9E8-4DD6-999F-A60663D43858}" type="datetimeFigureOut">
               <a:rPr lang="da-DK" smtClean="0"/>
-              <a:t>26-05-2015</a:t>
+              <a:t>27-05-2015</a:t>
             </a:fld>
             <a:endParaRPr lang="da-DK"/>
           </a:p>
@@ -2211,7 +2212,7 @@
           <a:p>
             <a:fld id="{EDC5A5AF-D9E8-4DD6-999F-A60663D43858}" type="datetimeFigureOut">
               <a:rPr lang="da-DK" smtClean="0"/>
-              <a:t>26-05-2015</a:t>
+              <a:t>27-05-2015</a:t>
             </a:fld>
             <a:endParaRPr lang="da-DK"/>
           </a:p>
@@ -2459,7 +2460,7 @@
           <a:p>
             <a:fld id="{EDC5A5AF-D9E8-4DD6-999F-A60663D43858}" type="datetimeFigureOut">
               <a:rPr lang="da-DK" smtClean="0"/>
-              <a:t>26-05-2015</a:t>
+              <a:t>27-05-2015</a:t>
             </a:fld>
             <a:endParaRPr lang="da-DK"/>
           </a:p>
@@ -2667,7 +2668,7 @@
           <a:p>
             <a:fld id="{EDC5A5AF-D9E8-4DD6-999F-A60663D43858}" type="datetimeFigureOut">
               <a:rPr lang="da-DK" smtClean="0"/>
-              <a:t>26-05-2015</a:t>
+              <a:t>27-05-2015</a:t>
             </a:fld>
             <a:endParaRPr lang="da-DK"/>
           </a:p>
@@ -5248,261 +5249,246 @@
           </p:spPr>
         </p:pic>
       </p:grpSp>
-      <p:grpSp>
-        <p:nvGrpSpPr>
-          <p:cNvPr id="53" name="Group 52"/>
-          <p:cNvGrpSpPr/>
+      <p:pic>
+        <p:nvPicPr>
+          <p:cNvPr id="54" name="Picture 4"/>
+          <p:cNvPicPr>
+            <a:picLocks noChangeAspect="1" noChangeArrowheads="1"/>
+          </p:cNvPicPr>
           <p:nvPr/>
-        </p:nvGrpSpPr>
-        <p:grpSpPr>
+        </p:nvPicPr>
+        <p:blipFill>
+          <a:blip r:embed="rId2">
+            <a:extLst>
+              <a:ext uri="{28A0092B-C50C-407E-A947-70E740481C1C}">
+                <a14:useLocalDpi xmlns:a14="http://schemas.microsoft.com/office/drawing/2010/main" val="0"/>
+              </a:ext>
+            </a:extLst>
+          </a:blip>
+          <a:srcRect/>
+          <a:stretch>
+            <a:fillRect/>
+          </a:stretch>
+        </p:blipFill>
+        <p:spPr bwMode="auto">
           <a:xfrm>
             <a:off x="805945" y="3380825"/>
-            <a:ext cx="1511568" cy="1971242"/>
-            <a:chOff x="601568" y="980728"/>
-            <a:chExt cx="2098225" cy="2736304"/>
-          </a:xfrm>
-        </p:grpSpPr>
-        <p:pic>
-          <p:nvPicPr>
-            <p:cNvPr id="54" name="Picture 4"/>
-            <p:cNvPicPr>
-              <a:picLocks noChangeAspect="1" noChangeArrowheads="1"/>
-            </p:cNvPicPr>
-            <p:nvPr/>
-          </p:nvPicPr>
-          <p:blipFill>
-            <a:blip r:embed="rId2">
-              <a:extLst>
-                <a:ext uri="{28A0092B-C50C-407E-A947-70E740481C1C}">
-                  <a14:useLocalDpi xmlns:a14="http://schemas.microsoft.com/office/drawing/2010/main" val="0"/>
-                </a:ext>
-              </a:extLst>
-            </a:blip>
-            <a:srcRect/>
-            <a:stretch>
-              <a:fillRect/>
-            </a:stretch>
-          </p:blipFill>
-          <p:spPr bwMode="auto">
-            <a:xfrm>
-              <a:off x="601568" y="980728"/>
-              <a:ext cx="2098224" cy="2725898"/>
-            </a:xfrm>
-            <a:prstGeom prst="rect">
-              <a:avLst/>
-            </a:prstGeom>
-            <a:ln>
-              <a:noFill/>
-            </a:ln>
-            <a:effectLst>
-              <a:outerShdw blurRad="292100" dist="139700" dir="2700000" algn="tl" rotWithShape="0">
-                <a:srgbClr val="333333">
-                  <a:alpha val="65000"/>
-                </a:srgbClr>
-              </a:outerShdw>
-            </a:effectLst>
+            <a:ext cx="1511567" cy="1963745"/>
+          </a:xfrm>
+          <a:prstGeom prst="rect">
+            <a:avLst/>
+          </a:prstGeom>
+          <a:ln>
+            <a:noFill/>
+          </a:ln>
+          <a:effectLst>
+            <a:outerShdw blurRad="292100" dist="139700" dir="2700000" algn="tl" rotWithShape="0">
+              <a:srgbClr val="333333">
+                <a:alpha val="65000"/>
+              </a:srgbClr>
+            </a:outerShdw>
+          </a:effectLst>
+          <a:extLst>
+            <a:ext uri="{909E8E84-426E-40DD-AFC4-6F175D3DCCD1}">
+              <a14:hiddenFill xmlns:a14="http://schemas.microsoft.com/office/drawing/2010/main">
+                <a:solidFill>
+                  <a:schemeClr val="accent1"/>
+                </a:solidFill>
+              </a14:hiddenFill>
+            </a:ext>
+            <a:ext uri="{91240B29-F687-4F45-9708-019B960494DF}">
+              <a14:hiddenLine xmlns:a14="http://schemas.microsoft.com/office/drawing/2010/main" w="9525">
+                <a:solidFill>
+                  <a:schemeClr val="tx1"/>
+                </a:solidFill>
+                <a:miter lim="800000"/>
+                <a:headEnd/>
+                <a:tailEnd/>
+              </a14:hiddenLine>
+            </a:ext>
+          </a:extLst>
+        </p:spPr>
+      </p:pic>
+      <p:sp>
+        <p:nvSpPr>
+          <p:cNvPr id="55" name="Rectangle 54"/>
+          <p:cNvSpPr/>
+          <p:nvPr/>
+        </p:nvSpPr>
+        <p:spPr>
+          <a:xfrm>
+            <a:off x="805946" y="4183208"/>
+            <a:ext cx="1511567" cy="1168859"/>
+          </a:xfrm>
+          <a:prstGeom prst="rect">
+            <a:avLst/>
+          </a:prstGeom>
+          <a:solidFill>
+            <a:srgbClr val="E6B9B8">
+              <a:alpha val="54902"/>
+            </a:srgbClr>
+          </a:solidFill>
+          <a:ln>
+            <a:noFill/>
+          </a:ln>
+        </p:spPr>
+        <p:style>
+          <a:lnRef idx="2">
+            <a:schemeClr val="accent1">
+              <a:shade val="50000"/>
+            </a:schemeClr>
+          </a:lnRef>
+          <a:fillRef idx="1">
+            <a:schemeClr val="accent1"/>
+          </a:fillRef>
+          <a:effectRef idx="0">
+            <a:schemeClr val="accent1"/>
+          </a:effectRef>
+          <a:fontRef idx="minor">
+            <a:schemeClr val="lt1"/>
+          </a:fontRef>
+        </p:style>
+        <p:txBody>
+          <a:bodyPr rtlCol="0" anchor="ctr"/>
+          <a:lstStyle/>
+          <a:p>
+            <a:pPr algn="ctr"/>
+            <a:endParaRPr lang="en-US"/>
+          </a:p>
+        </p:txBody>
+      </p:sp>
+      <p:pic>
+        <p:nvPicPr>
+          <p:cNvPr id="56" name="Picture 9" descr="C:\Users\AndersBender\AppData\Roaming\Skype\andersbender\media_messaging\media_cache\^3F60A93F08DDE063B5063BCBD834C97195A7C57F02DC6FBA14^pimgpsh_fullsize_distr.jpg"/>
+          <p:cNvPicPr>
+            <a:picLocks noChangeAspect="1" noChangeArrowheads="1"/>
+          </p:cNvPicPr>
+          <p:nvPr/>
+        </p:nvPicPr>
+        <p:blipFill>
+          <a:blip r:embed="rId3">
             <a:extLst>
-              <a:ext uri="{909E8E84-426E-40DD-AFC4-6F175D3DCCD1}">
-                <a14:hiddenFill xmlns:a14="http://schemas.microsoft.com/office/drawing/2010/main">
-                  <a:solidFill>
-                    <a:schemeClr val="accent1"/>
-                  </a:solidFill>
-                </a14:hiddenFill>
+              <a:ext uri="{BEBA8EAE-BF5A-486C-A8C5-ECC9F3942E4B}">
+                <a14:imgProps xmlns:a14="http://schemas.microsoft.com/office/drawing/2010/main">
+                  <a14:imgLayer r:embed="rId4">
+                    <a14:imgEffect>
+                      <a14:backgroundRemoval t="7407" b="88889" l="5634" r="91549">
+                        <a14:foregroundMark x1="35211" y1="50000" x2="35211" y2="50000"/>
+                        <a14:foregroundMark x1="49296" y1="33333" x2="7042" y2="75926"/>
+                        <a14:foregroundMark x1="76056" y1="46296" x2="91549" y2="75926"/>
+                        <a14:foregroundMark x1="22535" y1="77778" x2="73239" y2="81481"/>
+                      </a14:backgroundRemoval>
+                    </a14:imgEffect>
+                  </a14:imgLayer>
+                </a14:imgProps>
               </a:ext>
-              <a:ext uri="{91240B29-F687-4F45-9708-019B960494DF}">
-                <a14:hiddenLine xmlns:a14="http://schemas.microsoft.com/office/drawing/2010/main" w="9525">
-                  <a:solidFill>
-                    <a:schemeClr val="tx1"/>
-                  </a:solidFill>
-                  <a:miter lim="800000"/>
-                  <a:headEnd/>
-                  <a:tailEnd/>
-                </a14:hiddenLine>
+              <a:ext uri="{28A0092B-C50C-407E-A947-70E740481C1C}">
+                <a14:useLocalDpi xmlns:a14="http://schemas.microsoft.com/office/drawing/2010/main" val="0"/>
               </a:ext>
             </a:extLst>
-          </p:spPr>
-        </p:pic>
-        <p:sp>
-          <p:nvSpPr>
-            <p:cNvPr id="55" name="Rectangle 54"/>
-            <p:cNvSpPr/>
-            <p:nvPr/>
-          </p:nvSpPr>
-          <p:spPr>
-            <a:xfrm>
-              <a:off x="601569" y="2094525"/>
-              <a:ext cx="2098224" cy="1622507"/>
-            </a:xfrm>
-            <a:prstGeom prst="rect">
-              <a:avLst/>
-            </a:prstGeom>
-            <a:solidFill>
-              <a:srgbClr val="E6B9B8">
-                <a:alpha val="54902"/>
-              </a:srgbClr>
-            </a:solidFill>
-            <a:ln>
-              <a:noFill/>
-            </a:ln>
-          </p:spPr>
-          <p:style>
-            <a:lnRef idx="2">
-              <a:schemeClr val="accent1">
-                <a:shade val="50000"/>
-              </a:schemeClr>
-            </a:lnRef>
-            <a:fillRef idx="1">
-              <a:schemeClr val="accent1"/>
-            </a:fillRef>
-            <a:effectRef idx="0">
-              <a:schemeClr val="accent1"/>
-            </a:effectRef>
-            <a:fontRef idx="minor">
-              <a:schemeClr val="lt1"/>
-            </a:fontRef>
-          </p:style>
-          <p:txBody>
-            <a:bodyPr rtlCol="0" anchor="ctr"/>
-            <a:lstStyle/>
-            <a:p>
-              <a:pPr algn="ctr"/>
-              <a:endParaRPr lang="en-US"/>
-            </a:p>
-          </p:txBody>
-        </p:sp>
-        <p:pic>
-          <p:nvPicPr>
-            <p:cNvPr id="56" name="Picture 9" descr="C:\Users\AndersBender\AppData\Roaming\Skype\andersbender\media_messaging\media_cache\^3F60A93F08DDE063B5063BCBD834C97195A7C57F02DC6FBA14^pimgpsh_fullsize_distr.jpg"/>
-            <p:cNvPicPr>
-              <a:picLocks noChangeAspect="1" noChangeArrowheads="1"/>
-            </p:cNvPicPr>
-            <p:nvPr/>
-          </p:nvPicPr>
-          <p:blipFill>
-            <a:blip r:embed="rId3">
-              <a:extLst>
-                <a:ext uri="{BEBA8EAE-BF5A-486C-A8C5-ECC9F3942E4B}">
-                  <a14:imgProps xmlns:a14="http://schemas.microsoft.com/office/drawing/2010/main">
-                    <a14:imgLayer r:embed="rId4">
-                      <a14:imgEffect>
-                        <a14:backgroundRemoval t="7407" b="88889" l="5634" r="91549">
-                          <a14:foregroundMark x1="35211" y1="50000" x2="35211" y2="50000"/>
-                          <a14:foregroundMark x1="49296" y1="33333" x2="7042" y2="75926"/>
-                          <a14:foregroundMark x1="76056" y1="46296" x2="91549" y2="75926"/>
-                          <a14:foregroundMark x1="22535" y1="77778" x2="73239" y2="81481"/>
-                        </a14:backgroundRemoval>
-                      </a14:imgEffect>
-                    </a14:imgLayer>
-                  </a14:imgProps>
-                </a:ext>
-                <a:ext uri="{28A0092B-C50C-407E-A947-70E740481C1C}">
-                  <a14:useLocalDpi xmlns:a14="http://schemas.microsoft.com/office/drawing/2010/main" val="0"/>
-                </a:ext>
-              </a:extLst>
-            </a:blip>
-            <a:srcRect/>
-            <a:stretch>
-              <a:fillRect/>
-            </a:stretch>
-          </p:blipFill>
-          <p:spPr bwMode="auto">
-            <a:xfrm rot="19179872">
-              <a:off x="1848178" y="2458863"/>
-              <a:ext cx="493881" cy="375627"/>
-            </a:xfrm>
-            <a:prstGeom prst="rect">
-              <a:avLst/>
-            </a:prstGeom>
-            <a:noFill/>
+          </a:blip>
+          <a:srcRect/>
+          <a:stretch>
+            <a:fillRect/>
+          </a:stretch>
+        </p:blipFill>
+        <p:spPr bwMode="auto">
+          <a:xfrm rot="19179872">
+            <a:off x="1704007" y="4445678"/>
+            <a:ext cx="355793" cy="270603"/>
+          </a:xfrm>
+          <a:prstGeom prst="rect">
+            <a:avLst/>
+          </a:prstGeom>
+          <a:noFill/>
+          <a:extLst>
+            <a:ext uri="{909E8E84-426E-40DD-AFC4-6F175D3DCCD1}">
+              <a14:hiddenFill xmlns:a14="http://schemas.microsoft.com/office/drawing/2010/main">
+                <a:solidFill>
+                  <a:srgbClr val="FFFFFF"/>
+                </a:solidFill>
+              </a14:hiddenFill>
+            </a:ext>
+          </a:extLst>
+        </p:spPr>
+      </p:pic>
+      <p:pic>
+        <p:nvPicPr>
+          <p:cNvPr id="57" name="Picture 2" descr="C:\Project\detfederepo\unity\Assets\Sprites\Enemies\Alien.png"/>
+          <p:cNvPicPr>
+            <a:picLocks noChangeAspect="1" noChangeArrowheads="1"/>
+          </p:cNvPicPr>
+          <p:nvPr/>
+        </p:nvPicPr>
+        <p:blipFill>
+          <a:blip r:embed="rId5">
             <a:extLst>
-              <a:ext uri="{909E8E84-426E-40DD-AFC4-6F175D3DCCD1}">
-                <a14:hiddenFill xmlns:a14="http://schemas.microsoft.com/office/drawing/2010/main">
-                  <a:solidFill>
-                    <a:srgbClr val="FFFFFF"/>
-                  </a:solidFill>
-                </a14:hiddenFill>
+              <a:ext uri="{28A0092B-C50C-407E-A947-70E740481C1C}">
+                <a14:useLocalDpi xmlns:a14="http://schemas.microsoft.com/office/drawing/2010/main" val="0"/>
               </a:ext>
             </a:extLst>
-          </p:spPr>
-        </p:pic>
-        <p:pic>
-          <p:nvPicPr>
-            <p:cNvPr id="57" name="Picture 2" descr="C:\Project\detfederepo\unity\Assets\Sprites\Enemies\Alien.png"/>
-            <p:cNvPicPr>
-              <a:picLocks noChangeAspect="1" noChangeArrowheads="1"/>
-            </p:cNvPicPr>
-            <p:nvPr/>
-          </p:nvPicPr>
-          <p:blipFill>
-            <a:blip r:embed="rId5">
-              <a:extLst>
-                <a:ext uri="{28A0092B-C50C-407E-A947-70E740481C1C}">
-                  <a14:useLocalDpi xmlns:a14="http://schemas.microsoft.com/office/drawing/2010/main" val="0"/>
-                </a:ext>
-              </a:extLst>
-            </a:blip>
-            <a:srcRect/>
-            <a:stretch>
-              <a:fillRect/>
-            </a:stretch>
-          </p:blipFill>
-          <p:spPr bwMode="auto">
-            <a:xfrm rot="3865126">
-              <a:off x="1081373" y="2975177"/>
-              <a:ext cx="487888" cy="487888"/>
-            </a:xfrm>
-            <a:prstGeom prst="rect">
-              <a:avLst/>
-            </a:prstGeom>
-            <a:noFill/>
-            <a:extLst>
-              <a:ext uri="{909E8E84-426E-40DD-AFC4-6F175D3DCCD1}">
-                <a14:hiddenFill xmlns:a14="http://schemas.microsoft.com/office/drawing/2010/main">
-                  <a:solidFill>
-                    <a:srgbClr val="FFFFFF"/>
-                  </a:solidFill>
-                </a14:hiddenFill>
-              </a:ext>
-            </a:extLst>
-          </p:spPr>
-        </p:pic>
-        <p:cxnSp>
-          <p:nvCxnSpPr>
-            <p:cNvPr id="58" name="Straight Connector 57"/>
-            <p:cNvCxnSpPr/>
-            <p:nvPr/>
-          </p:nvCxnSpPr>
-          <p:spPr>
-            <a:xfrm flipV="1">
-              <a:off x="1475656" y="2784813"/>
-              <a:ext cx="475907" cy="370137"/>
-            </a:xfrm>
-            <a:prstGeom prst="line">
-              <a:avLst/>
-            </a:prstGeom>
-            <a:ln w="38100">
-              <a:solidFill>
-                <a:srgbClr val="FFFF00"/>
-              </a:solidFill>
-              <a:prstDash val="sysDash"/>
-            </a:ln>
-          </p:spPr>
-          <p:style>
-            <a:lnRef idx="1">
-              <a:schemeClr val="accent1"/>
-            </a:lnRef>
-            <a:fillRef idx="0">
-              <a:schemeClr val="accent1"/>
-            </a:fillRef>
-            <a:effectRef idx="0">
-              <a:schemeClr val="accent1"/>
-            </a:effectRef>
-            <a:fontRef idx="minor">
-              <a:schemeClr val="tx1"/>
-            </a:fontRef>
-          </p:style>
-        </p:cxnSp>
-      </p:grpSp>
+          </a:blip>
+          <a:srcRect/>
+          <a:stretch>
+            <a:fillRect/>
+          </a:stretch>
+        </p:blipFill>
+        <p:spPr bwMode="auto">
+          <a:xfrm rot="3865126">
+            <a:off x="1151598" y="4817632"/>
+            <a:ext cx="351476" cy="351476"/>
+          </a:xfrm>
+          <a:prstGeom prst="rect">
+            <a:avLst/>
+          </a:prstGeom>
+          <a:noFill/>
+          <a:extLst>
+            <a:ext uri="{909E8E84-426E-40DD-AFC4-6F175D3DCCD1}">
+              <a14:hiddenFill xmlns:a14="http://schemas.microsoft.com/office/drawing/2010/main">
+                <a:solidFill>
+                  <a:srgbClr val="FFFFFF"/>
+                </a:solidFill>
+              </a14:hiddenFill>
+            </a:ext>
+          </a:extLst>
+        </p:spPr>
+      </p:pic>
+      <p:cxnSp>
+        <p:nvCxnSpPr>
+          <p:cNvPr id="58" name="Straight Connector 57"/>
+          <p:cNvCxnSpPr/>
+          <p:nvPr/>
+        </p:nvCxnSpPr>
+        <p:spPr>
+          <a:xfrm flipV="1">
+            <a:off x="1435641" y="4680494"/>
+            <a:ext cx="342845" cy="266648"/>
+          </a:xfrm>
+          <a:prstGeom prst="line">
+            <a:avLst/>
+          </a:prstGeom>
+          <a:ln w="38100">
+            <a:solidFill>
+              <a:srgbClr val="FFFF00"/>
+            </a:solidFill>
+            <a:prstDash val="sysDash"/>
+          </a:ln>
+        </p:spPr>
+        <p:style>
+          <a:lnRef idx="1">
+            <a:schemeClr val="accent1"/>
+          </a:lnRef>
+          <a:fillRef idx="0">
+            <a:schemeClr val="accent1"/>
+          </a:fillRef>
+          <a:effectRef idx="0">
+            <a:schemeClr val="accent1"/>
+          </a:effectRef>
+          <a:fontRef idx="minor">
+            <a:schemeClr val="tx1"/>
+          </a:fontRef>
+        </p:style>
+      </p:cxnSp>
       <p:pic>
         <p:nvPicPr>
           <p:cNvPr id="60" name="Picture 4"/>
@@ -6110,6 +6096,936 @@
     <p:extLst>
       <p:ext uri="{BB962C8B-B14F-4D97-AF65-F5344CB8AC3E}">
         <p14:creationId xmlns:p14="http://schemas.microsoft.com/office/powerpoint/2010/main" val="1420722426"/>
+      </p:ext>
+    </p:extLst>
+  </p:cSld>
+  <p:clrMapOvr>
+    <a:masterClrMapping/>
+  </p:clrMapOvr>
+</p:sld>
+</file>
+
+<file path=ppt/slides/slide4.xml><?xml version="1.0" encoding="utf-8"?>
+<p:sld xmlns:a="http://schemas.openxmlformats.org/drawingml/2006/main" xmlns:r="http://schemas.openxmlformats.org/officeDocument/2006/relationships" xmlns:p="http://schemas.openxmlformats.org/presentationml/2006/main">
+  <p:cSld>
+    <p:spTree>
+      <p:nvGrpSpPr>
+        <p:cNvPr id="1" name=""/>
+        <p:cNvGrpSpPr/>
+        <p:nvPr/>
+      </p:nvGrpSpPr>
+      <p:grpSpPr>
+        <a:xfrm>
+          <a:off x="0" y="0"/>
+          <a:ext cx="0" cy="0"/>
+          <a:chOff x="0" y="0"/>
+          <a:chExt cx="0" cy="0"/>
+        </a:xfrm>
+      </p:grpSpPr>
+      <p:pic>
+        <p:nvPicPr>
+          <p:cNvPr id="18" name="Picture 5"/>
+          <p:cNvPicPr>
+            <a:picLocks noChangeAspect="1" noChangeArrowheads="1"/>
+          </p:cNvPicPr>
+          <p:nvPr/>
+        </p:nvPicPr>
+        <p:blipFill>
+          <a:blip r:embed="rId2">
+            <a:extLst>
+              <a:ext uri="{28A0092B-C50C-407E-A947-70E740481C1C}">
+                <a14:useLocalDpi xmlns:a14="http://schemas.microsoft.com/office/drawing/2010/main" val="0"/>
+              </a:ext>
+            </a:extLst>
+          </a:blip>
+          <a:srcRect/>
+          <a:stretch>
+            <a:fillRect/>
+          </a:stretch>
+        </p:blipFill>
+        <p:spPr bwMode="auto">
+          <a:xfrm>
+            <a:off x="3059832" y="1772816"/>
+            <a:ext cx="1796262" cy="2232248"/>
+          </a:xfrm>
+          <a:prstGeom prst="rect">
+            <a:avLst/>
+          </a:prstGeom>
+          <a:ln>
+            <a:noFill/>
+          </a:ln>
+          <a:effectLst>
+            <a:outerShdw blurRad="292100" dist="139700" dir="2700000" algn="tl" rotWithShape="0">
+              <a:srgbClr val="333333">
+                <a:alpha val="65000"/>
+              </a:srgbClr>
+            </a:outerShdw>
+          </a:effectLst>
+          <a:extLst>
+            <a:ext uri="{909E8E84-426E-40DD-AFC4-6F175D3DCCD1}">
+              <a14:hiddenFill xmlns:a14="http://schemas.microsoft.com/office/drawing/2010/main">
+                <a:solidFill>
+                  <a:schemeClr val="accent1"/>
+                </a:solidFill>
+              </a14:hiddenFill>
+            </a:ext>
+            <a:ext uri="{91240B29-F687-4F45-9708-019B960494DF}">
+              <a14:hiddenLine xmlns:a14="http://schemas.microsoft.com/office/drawing/2010/main" w="9525">
+                <a:solidFill>
+                  <a:schemeClr val="tx1"/>
+                </a:solidFill>
+                <a:miter lim="800000"/>
+                <a:headEnd/>
+                <a:tailEnd/>
+              </a14:hiddenLine>
+            </a:ext>
+          </a:extLst>
+        </p:spPr>
+      </p:pic>
+      <p:sp>
+        <p:nvSpPr>
+          <p:cNvPr id="21" name="Rectangle 20"/>
+          <p:cNvSpPr/>
+          <p:nvPr/>
+        </p:nvSpPr>
+        <p:spPr>
+          <a:xfrm>
+            <a:off x="3607923" y="1772816"/>
+            <a:ext cx="350040" cy="2232248"/>
+          </a:xfrm>
+          <a:prstGeom prst="rect">
+            <a:avLst/>
+          </a:prstGeom>
+          <a:solidFill>
+            <a:srgbClr val="E6B9B8">
+              <a:alpha val="54902"/>
+            </a:srgbClr>
+          </a:solidFill>
+          <a:ln>
+            <a:noFill/>
+          </a:ln>
+        </p:spPr>
+        <p:style>
+          <a:lnRef idx="2">
+            <a:schemeClr val="accent1">
+              <a:shade val="50000"/>
+            </a:schemeClr>
+          </a:lnRef>
+          <a:fillRef idx="1">
+            <a:schemeClr val="accent1"/>
+          </a:fillRef>
+          <a:effectRef idx="0">
+            <a:schemeClr val="accent1"/>
+          </a:effectRef>
+          <a:fontRef idx="minor">
+            <a:schemeClr val="lt1"/>
+          </a:fontRef>
+        </p:style>
+        <p:txBody>
+          <a:bodyPr rtlCol="0" anchor="ctr"/>
+          <a:lstStyle/>
+          <a:p>
+            <a:pPr algn="ctr"/>
+            <a:endParaRPr lang="en-US"/>
+          </a:p>
+        </p:txBody>
+      </p:sp>
+      <p:sp>
+        <p:nvSpPr>
+          <p:cNvPr id="22" name="Rectangle 21"/>
+          <p:cNvSpPr/>
+          <p:nvPr/>
+        </p:nvSpPr>
+        <p:spPr>
+          <a:xfrm>
+            <a:off x="3989368" y="1767698"/>
+            <a:ext cx="866725" cy="2232248"/>
+          </a:xfrm>
+          <a:prstGeom prst="rect">
+            <a:avLst/>
+          </a:prstGeom>
+          <a:solidFill>
+            <a:srgbClr val="E6B9B8">
+              <a:alpha val="54902"/>
+            </a:srgbClr>
+          </a:solidFill>
+          <a:ln>
+            <a:noFill/>
+          </a:ln>
+        </p:spPr>
+        <p:style>
+          <a:lnRef idx="2">
+            <a:schemeClr val="accent1">
+              <a:shade val="50000"/>
+            </a:schemeClr>
+          </a:lnRef>
+          <a:fillRef idx="1">
+            <a:schemeClr val="accent1"/>
+          </a:fillRef>
+          <a:effectRef idx="0">
+            <a:schemeClr val="accent1"/>
+          </a:effectRef>
+          <a:fontRef idx="minor">
+            <a:schemeClr val="lt1"/>
+          </a:fontRef>
+        </p:style>
+        <p:txBody>
+          <a:bodyPr rtlCol="0" anchor="ctr"/>
+          <a:lstStyle/>
+          <a:p>
+            <a:pPr algn="ctr"/>
+            <a:endParaRPr lang="en-US"/>
+          </a:p>
+        </p:txBody>
+      </p:sp>
+      <p:pic>
+        <p:nvPicPr>
+          <p:cNvPr id="23" name="Picture 22" descr="C:\Users\AndersBender\AppData\Roaming\Skype\andersbender\media_messaging\media_cache\^3F60A93F08DDE063B5063BCBD834C97195A7C57F02DC6FBA14^pimgpsh_fullsize_distr.jpg"/>
+          <p:cNvPicPr>
+            <a:picLocks noChangeAspect="1" noChangeArrowheads="1"/>
+          </p:cNvPicPr>
+          <p:nvPr/>
+        </p:nvPicPr>
+        <p:blipFill>
+          <a:blip r:embed="rId3">
+            <a:extLst>
+              <a:ext uri="{BEBA8EAE-BF5A-486C-A8C5-ECC9F3942E4B}">
+                <a14:imgProps xmlns:a14="http://schemas.microsoft.com/office/drawing/2010/main">
+                  <a14:imgLayer r:embed="rId4">
+                    <a14:imgEffect>
+                      <a14:backgroundRemoval t="7407" b="88889" l="5634" r="91549">
+                        <a14:foregroundMark x1="35211" y1="50000" x2="35211" y2="50000"/>
+                        <a14:foregroundMark x1="49296" y1="33333" x2="7042" y2="75926"/>
+                        <a14:foregroundMark x1="76056" y1="46296" x2="91549" y2="75926"/>
+                        <a14:foregroundMark x1="22535" y1="77778" x2="73239" y2="81481"/>
+                      </a14:backgroundRemoval>
+                    </a14:imgEffect>
+                  </a14:imgLayer>
+                </a14:imgProps>
+              </a:ext>
+              <a:ext uri="{28A0092B-C50C-407E-A947-70E740481C1C}">
+                <a14:useLocalDpi xmlns:a14="http://schemas.microsoft.com/office/drawing/2010/main" val="0"/>
+              </a:ext>
+            </a:extLst>
+          </a:blip>
+          <a:srcRect/>
+          <a:stretch>
+            <a:fillRect/>
+          </a:stretch>
+        </p:blipFill>
+        <p:spPr bwMode="auto">
+          <a:xfrm rot="11594354">
+            <a:off x="3434553" y="2420546"/>
+            <a:ext cx="355793" cy="270603"/>
+          </a:xfrm>
+          <a:prstGeom prst="rect">
+            <a:avLst/>
+          </a:prstGeom>
+          <a:noFill/>
+          <a:extLst>
+            <a:ext uri="{909E8E84-426E-40DD-AFC4-6F175D3DCCD1}">
+              <a14:hiddenFill xmlns:a14="http://schemas.microsoft.com/office/drawing/2010/main">
+                <a:solidFill>
+                  <a:srgbClr val="FFFFFF"/>
+                </a:solidFill>
+              </a14:hiddenFill>
+            </a:ext>
+          </a:extLst>
+        </p:spPr>
+      </p:pic>
+      <p:pic>
+        <p:nvPicPr>
+          <p:cNvPr id="1029" name="Picture 5"/>
+          <p:cNvPicPr>
+            <a:picLocks noChangeAspect="1" noChangeArrowheads="1"/>
+          </p:cNvPicPr>
+          <p:nvPr/>
+        </p:nvPicPr>
+        <p:blipFill>
+          <a:blip r:embed="rId2">
+            <a:extLst>
+              <a:ext uri="{28A0092B-C50C-407E-A947-70E740481C1C}">
+                <a14:useLocalDpi xmlns:a14="http://schemas.microsoft.com/office/drawing/2010/main" val="0"/>
+              </a:ext>
+            </a:extLst>
+          </a:blip>
+          <a:srcRect/>
+          <a:stretch>
+            <a:fillRect/>
+          </a:stretch>
+        </p:blipFill>
+        <p:spPr bwMode="auto">
+          <a:xfrm>
+            <a:off x="971600" y="1772816"/>
+            <a:ext cx="1796262" cy="2232248"/>
+          </a:xfrm>
+          <a:prstGeom prst="rect">
+            <a:avLst/>
+          </a:prstGeom>
+          <a:ln>
+            <a:noFill/>
+          </a:ln>
+          <a:effectLst>
+            <a:outerShdw blurRad="292100" dist="139700" dir="2700000" algn="tl" rotWithShape="0">
+              <a:srgbClr val="333333">
+                <a:alpha val="65000"/>
+              </a:srgbClr>
+            </a:outerShdw>
+          </a:effectLst>
+          <a:extLst>
+            <a:ext uri="{909E8E84-426E-40DD-AFC4-6F175D3DCCD1}">
+              <a14:hiddenFill xmlns:a14="http://schemas.microsoft.com/office/drawing/2010/main">
+                <a:solidFill>
+                  <a:schemeClr val="accent1"/>
+                </a:solidFill>
+              </a14:hiddenFill>
+            </a:ext>
+            <a:ext uri="{91240B29-F687-4F45-9708-019B960494DF}">
+              <a14:hiddenLine xmlns:a14="http://schemas.microsoft.com/office/drawing/2010/main" w="9525">
+                <a:solidFill>
+                  <a:schemeClr val="tx1"/>
+                </a:solidFill>
+                <a:miter lim="800000"/>
+                <a:headEnd/>
+                <a:tailEnd/>
+              </a14:hiddenLine>
+            </a:ext>
+          </a:extLst>
+        </p:spPr>
+      </p:pic>
+      <p:sp>
+        <p:nvSpPr>
+          <p:cNvPr id="12" name="Rectangle 11"/>
+          <p:cNvSpPr/>
+          <p:nvPr/>
+        </p:nvSpPr>
+        <p:spPr>
+          <a:xfrm>
+            <a:off x="1519691" y="1772816"/>
+            <a:ext cx="350040" cy="2232248"/>
+          </a:xfrm>
+          <a:prstGeom prst="rect">
+            <a:avLst/>
+          </a:prstGeom>
+          <a:solidFill>
+            <a:srgbClr val="E6B9B8">
+              <a:alpha val="54902"/>
+            </a:srgbClr>
+          </a:solidFill>
+          <a:ln>
+            <a:noFill/>
+          </a:ln>
+        </p:spPr>
+        <p:style>
+          <a:lnRef idx="2">
+            <a:schemeClr val="accent1">
+              <a:shade val="50000"/>
+            </a:schemeClr>
+          </a:lnRef>
+          <a:fillRef idx="1">
+            <a:schemeClr val="accent1"/>
+          </a:fillRef>
+          <a:effectRef idx="0">
+            <a:schemeClr val="accent1"/>
+          </a:effectRef>
+          <a:fontRef idx="minor">
+            <a:schemeClr val="lt1"/>
+          </a:fontRef>
+        </p:style>
+        <p:txBody>
+          <a:bodyPr rtlCol="0" anchor="ctr"/>
+          <a:lstStyle/>
+          <a:p>
+            <a:pPr algn="ctr"/>
+            <a:endParaRPr lang="en-US"/>
+          </a:p>
+        </p:txBody>
+      </p:sp>
+      <p:sp>
+        <p:nvSpPr>
+          <p:cNvPr id="13" name="Rectangle 12"/>
+          <p:cNvSpPr/>
+          <p:nvPr/>
+        </p:nvSpPr>
+        <p:spPr>
+          <a:xfrm>
+            <a:off x="1901136" y="1767698"/>
+            <a:ext cx="866725" cy="2232248"/>
+          </a:xfrm>
+          <a:prstGeom prst="rect">
+            <a:avLst/>
+          </a:prstGeom>
+          <a:solidFill>
+            <a:srgbClr val="E6B9B8">
+              <a:alpha val="54902"/>
+            </a:srgbClr>
+          </a:solidFill>
+          <a:ln>
+            <a:noFill/>
+          </a:ln>
+        </p:spPr>
+        <p:style>
+          <a:lnRef idx="2">
+            <a:schemeClr val="accent1">
+              <a:shade val="50000"/>
+            </a:schemeClr>
+          </a:lnRef>
+          <a:fillRef idx="1">
+            <a:schemeClr val="accent1"/>
+          </a:fillRef>
+          <a:effectRef idx="0">
+            <a:schemeClr val="accent1"/>
+          </a:effectRef>
+          <a:fontRef idx="minor">
+            <a:schemeClr val="lt1"/>
+          </a:fontRef>
+        </p:style>
+        <p:txBody>
+          <a:bodyPr rtlCol="0" anchor="ctr"/>
+          <a:lstStyle/>
+          <a:p>
+            <a:pPr algn="ctr"/>
+            <a:endParaRPr lang="en-US"/>
+          </a:p>
+        </p:txBody>
+      </p:sp>
+      <p:pic>
+        <p:nvPicPr>
+          <p:cNvPr id="10" name="Picture 9" descr="C:\Users\AndersBender\AppData\Roaming\Skype\andersbender\media_messaging\media_cache\^3F60A93F08DDE063B5063BCBD834C97195A7C57F02DC6FBA14^pimgpsh_fullsize_distr.jpg"/>
+          <p:cNvPicPr>
+            <a:picLocks noChangeAspect="1" noChangeArrowheads="1"/>
+          </p:cNvPicPr>
+          <p:nvPr/>
+        </p:nvPicPr>
+        <p:blipFill>
+          <a:blip r:embed="rId3">
+            <a:extLst>
+              <a:ext uri="{BEBA8EAE-BF5A-486C-A8C5-ECC9F3942E4B}">
+                <a14:imgProps xmlns:a14="http://schemas.microsoft.com/office/drawing/2010/main">
+                  <a14:imgLayer r:embed="rId4">
+                    <a14:imgEffect>
+                      <a14:backgroundRemoval t="7407" b="88889" l="5634" r="91549">
+                        <a14:foregroundMark x1="35211" y1="50000" x2="35211" y2="50000"/>
+                        <a14:foregroundMark x1="49296" y1="33333" x2="7042" y2="75926"/>
+                        <a14:foregroundMark x1="76056" y1="46296" x2="91549" y2="75926"/>
+                        <a14:foregroundMark x1="22535" y1="77778" x2="73239" y2="81481"/>
+                      </a14:backgroundRemoval>
+                    </a14:imgEffect>
+                  </a14:imgLayer>
+                </a14:imgProps>
+              </a:ext>
+              <a:ext uri="{28A0092B-C50C-407E-A947-70E740481C1C}">
+                <a14:useLocalDpi xmlns:a14="http://schemas.microsoft.com/office/drawing/2010/main" val="0"/>
+              </a:ext>
+            </a:extLst>
+          </a:blip>
+          <a:srcRect/>
+          <a:stretch>
+            <a:fillRect/>
+          </a:stretch>
+        </p:blipFill>
+        <p:spPr bwMode="auto">
+          <a:xfrm rot="11594354">
+            <a:off x="1691834" y="2499548"/>
+            <a:ext cx="355793" cy="270603"/>
+          </a:xfrm>
+          <a:prstGeom prst="rect">
+            <a:avLst/>
+          </a:prstGeom>
+          <a:noFill/>
+          <a:extLst>
+            <a:ext uri="{909E8E84-426E-40DD-AFC4-6F175D3DCCD1}">
+              <a14:hiddenFill xmlns:a14="http://schemas.microsoft.com/office/drawing/2010/main">
+                <a:solidFill>
+                  <a:srgbClr val="FFFFFF"/>
+                </a:solidFill>
+              </a14:hiddenFill>
+            </a:ext>
+          </a:extLst>
+        </p:spPr>
+      </p:pic>
+      <p:cxnSp>
+        <p:nvCxnSpPr>
+          <p:cNvPr id="20" name="Straight Connector 19"/>
+          <p:cNvCxnSpPr/>
+          <p:nvPr/>
+        </p:nvCxnSpPr>
+        <p:spPr>
+          <a:xfrm>
+            <a:off x="3782943" y="2606274"/>
+            <a:ext cx="457201" cy="28575"/>
+          </a:xfrm>
+          <a:prstGeom prst="line">
+            <a:avLst/>
+          </a:prstGeom>
+          <a:ln w="38100">
+            <a:solidFill>
+              <a:srgbClr val="FFFF00"/>
+            </a:solidFill>
+            <a:prstDash val="sysDash"/>
+          </a:ln>
+        </p:spPr>
+        <p:style>
+          <a:lnRef idx="1">
+            <a:schemeClr val="accent1"/>
+          </a:lnRef>
+          <a:fillRef idx="0">
+            <a:schemeClr val="accent1"/>
+          </a:fillRef>
+          <a:effectRef idx="0">
+            <a:schemeClr val="accent1"/>
+          </a:effectRef>
+          <a:fontRef idx="minor">
+            <a:schemeClr val="tx1"/>
+          </a:fontRef>
+        </p:style>
+      </p:cxnSp>
+      <p:cxnSp>
+        <p:nvCxnSpPr>
+          <p:cNvPr id="11" name="Straight Connector 10"/>
+          <p:cNvCxnSpPr/>
+          <p:nvPr/>
+        </p:nvCxnSpPr>
+        <p:spPr>
+          <a:xfrm>
+            <a:off x="2009775" y="2657475"/>
+            <a:ext cx="457201" cy="28575"/>
+          </a:xfrm>
+          <a:prstGeom prst="line">
+            <a:avLst/>
+          </a:prstGeom>
+          <a:ln w="38100">
+            <a:solidFill>
+              <a:srgbClr val="FFFF00"/>
+            </a:solidFill>
+            <a:prstDash val="sysDash"/>
+          </a:ln>
+        </p:spPr>
+        <p:style>
+          <a:lnRef idx="1">
+            <a:schemeClr val="accent1"/>
+          </a:lnRef>
+          <a:fillRef idx="0">
+            <a:schemeClr val="accent1"/>
+          </a:fillRef>
+          <a:effectRef idx="0">
+            <a:schemeClr val="accent1"/>
+          </a:effectRef>
+          <a:fontRef idx="minor">
+            <a:schemeClr val="tx1"/>
+          </a:fontRef>
+        </p:style>
+      </p:cxnSp>
+      <p:pic>
+        <p:nvPicPr>
+          <p:cNvPr id="9" name="Picture 2" descr="C:\Project\detfederepo\unity\Assets\Sprites\Enemies\Alien.png"/>
+          <p:cNvPicPr>
+            <a:picLocks noChangeAspect="1" noChangeArrowheads="1"/>
+          </p:cNvPicPr>
+          <p:nvPr/>
+        </p:nvPicPr>
+        <p:blipFill>
+          <a:blip r:embed="rId5">
+            <a:extLst>
+              <a:ext uri="{28A0092B-C50C-407E-A947-70E740481C1C}">
+                <a14:useLocalDpi xmlns:a14="http://schemas.microsoft.com/office/drawing/2010/main" val="0"/>
+              </a:ext>
+            </a:extLst>
+          </a:blip>
+          <a:srcRect/>
+          <a:stretch>
+            <a:fillRect/>
+          </a:stretch>
+        </p:blipFill>
+        <p:spPr bwMode="auto">
+          <a:xfrm rot="16716426">
+            <a:off x="2392064" y="2543031"/>
+            <a:ext cx="351476" cy="351476"/>
+          </a:xfrm>
+          <a:prstGeom prst="rect">
+            <a:avLst/>
+          </a:prstGeom>
+          <a:noFill/>
+          <a:extLst>
+            <a:ext uri="{909E8E84-426E-40DD-AFC4-6F175D3DCCD1}">
+              <a14:hiddenFill xmlns:a14="http://schemas.microsoft.com/office/drawing/2010/main">
+                <a:solidFill>
+                  <a:srgbClr val="FFFFFF"/>
+                </a:solidFill>
+              </a14:hiddenFill>
+            </a:ext>
+          </a:extLst>
+        </p:spPr>
+      </p:pic>
+      <p:pic>
+        <p:nvPicPr>
+          <p:cNvPr id="19" name="Picture 2" descr="C:\Project\detfederepo\unity\Assets\Sprites\Enemies\Alien.png"/>
+          <p:cNvPicPr>
+            <a:picLocks noChangeAspect="1" noChangeArrowheads="1"/>
+          </p:cNvPicPr>
+          <p:nvPr/>
+        </p:nvPicPr>
+        <p:blipFill>
+          <a:blip r:embed="rId5">
+            <a:extLst>
+              <a:ext uri="{28A0092B-C50C-407E-A947-70E740481C1C}">
+                <a14:useLocalDpi xmlns:a14="http://schemas.microsoft.com/office/drawing/2010/main" val="0"/>
+              </a:ext>
+            </a:extLst>
+          </a:blip>
+          <a:srcRect/>
+          <a:stretch>
+            <a:fillRect/>
+          </a:stretch>
+        </p:blipFill>
+        <p:spPr bwMode="auto">
+          <a:xfrm rot="16716426">
+            <a:off x="4164274" y="2496023"/>
+            <a:ext cx="351476" cy="351476"/>
+          </a:xfrm>
+          <a:prstGeom prst="rect">
+            <a:avLst/>
+          </a:prstGeom>
+          <a:noFill/>
+          <a:extLst>
+            <a:ext uri="{909E8E84-426E-40DD-AFC4-6F175D3DCCD1}">
+              <a14:hiddenFill xmlns:a14="http://schemas.microsoft.com/office/drawing/2010/main">
+                <a:solidFill>
+                  <a:srgbClr val="FFFFFF"/>
+                </a:solidFill>
+              </a14:hiddenFill>
+            </a:ext>
+          </a:extLst>
+        </p:spPr>
+      </p:pic>
+      <p:pic>
+        <p:nvPicPr>
+          <p:cNvPr id="24" name="Picture 5"/>
+          <p:cNvPicPr>
+            <a:picLocks noChangeAspect="1" noChangeArrowheads="1"/>
+          </p:cNvPicPr>
+          <p:nvPr/>
+        </p:nvPicPr>
+        <p:blipFill>
+          <a:blip r:embed="rId2">
+            <a:extLst>
+              <a:ext uri="{28A0092B-C50C-407E-A947-70E740481C1C}">
+                <a14:useLocalDpi xmlns:a14="http://schemas.microsoft.com/office/drawing/2010/main" val="0"/>
+              </a:ext>
+            </a:extLst>
+          </a:blip>
+          <a:srcRect/>
+          <a:stretch>
+            <a:fillRect/>
+          </a:stretch>
+        </p:blipFill>
+        <p:spPr bwMode="auto">
+          <a:xfrm>
+            <a:off x="5117246" y="1777934"/>
+            <a:ext cx="1796262" cy="2232248"/>
+          </a:xfrm>
+          <a:prstGeom prst="rect">
+            <a:avLst/>
+          </a:prstGeom>
+          <a:ln>
+            <a:noFill/>
+          </a:ln>
+          <a:effectLst>
+            <a:outerShdw blurRad="292100" dist="139700" dir="2700000" algn="tl" rotWithShape="0">
+              <a:srgbClr val="333333">
+                <a:alpha val="65000"/>
+              </a:srgbClr>
+            </a:outerShdw>
+          </a:effectLst>
+          <a:extLst>
+            <a:ext uri="{909E8E84-426E-40DD-AFC4-6F175D3DCCD1}">
+              <a14:hiddenFill xmlns:a14="http://schemas.microsoft.com/office/drawing/2010/main">
+                <a:solidFill>
+                  <a:schemeClr val="accent1"/>
+                </a:solidFill>
+              </a14:hiddenFill>
+            </a:ext>
+            <a:ext uri="{91240B29-F687-4F45-9708-019B960494DF}">
+              <a14:hiddenLine xmlns:a14="http://schemas.microsoft.com/office/drawing/2010/main" w="9525">
+                <a:solidFill>
+                  <a:schemeClr val="tx1"/>
+                </a:solidFill>
+                <a:miter lim="800000"/>
+                <a:headEnd/>
+                <a:tailEnd/>
+              </a14:hiddenLine>
+            </a:ext>
+          </a:extLst>
+        </p:spPr>
+      </p:pic>
+      <p:sp>
+        <p:nvSpPr>
+          <p:cNvPr id="25" name="Rectangle 24"/>
+          <p:cNvSpPr/>
+          <p:nvPr/>
+        </p:nvSpPr>
+        <p:spPr>
+          <a:xfrm>
+            <a:off x="5665337" y="1777934"/>
+            <a:ext cx="350040" cy="2232248"/>
+          </a:xfrm>
+          <a:prstGeom prst="rect">
+            <a:avLst/>
+          </a:prstGeom>
+          <a:solidFill>
+            <a:srgbClr val="E6B9B8">
+              <a:alpha val="54902"/>
+            </a:srgbClr>
+          </a:solidFill>
+          <a:ln>
+            <a:noFill/>
+          </a:ln>
+        </p:spPr>
+        <p:style>
+          <a:lnRef idx="2">
+            <a:schemeClr val="accent1">
+              <a:shade val="50000"/>
+            </a:schemeClr>
+          </a:lnRef>
+          <a:fillRef idx="1">
+            <a:schemeClr val="accent1"/>
+          </a:fillRef>
+          <a:effectRef idx="0">
+            <a:schemeClr val="accent1"/>
+          </a:effectRef>
+          <a:fontRef idx="minor">
+            <a:schemeClr val="lt1"/>
+          </a:fontRef>
+        </p:style>
+        <p:txBody>
+          <a:bodyPr rtlCol="0" anchor="ctr"/>
+          <a:lstStyle/>
+          <a:p>
+            <a:pPr algn="ctr"/>
+            <a:endParaRPr lang="en-US"/>
+          </a:p>
+        </p:txBody>
+      </p:sp>
+      <p:sp>
+        <p:nvSpPr>
+          <p:cNvPr id="26" name="Rectangle 25"/>
+          <p:cNvSpPr/>
+          <p:nvPr/>
+        </p:nvSpPr>
+        <p:spPr>
+          <a:xfrm>
+            <a:off x="6046782" y="1772816"/>
+            <a:ext cx="866725" cy="2232248"/>
+          </a:xfrm>
+          <a:prstGeom prst="rect">
+            <a:avLst/>
+          </a:prstGeom>
+          <a:solidFill>
+            <a:srgbClr val="E6B9B8">
+              <a:alpha val="54902"/>
+            </a:srgbClr>
+          </a:solidFill>
+          <a:ln>
+            <a:noFill/>
+          </a:ln>
+        </p:spPr>
+        <p:style>
+          <a:lnRef idx="2">
+            <a:schemeClr val="accent1">
+              <a:shade val="50000"/>
+            </a:schemeClr>
+          </a:lnRef>
+          <a:fillRef idx="1">
+            <a:schemeClr val="accent1"/>
+          </a:fillRef>
+          <a:effectRef idx="0">
+            <a:schemeClr val="accent1"/>
+          </a:effectRef>
+          <a:fontRef idx="minor">
+            <a:schemeClr val="lt1"/>
+          </a:fontRef>
+        </p:style>
+        <p:txBody>
+          <a:bodyPr rtlCol="0" anchor="ctr"/>
+          <a:lstStyle/>
+          <a:p>
+            <a:pPr algn="ctr"/>
+            <a:endParaRPr lang="en-US"/>
+          </a:p>
+        </p:txBody>
+      </p:sp>
+      <p:pic>
+        <p:nvPicPr>
+          <p:cNvPr id="27" name="Picture 26" descr="C:\Users\AndersBender\AppData\Roaming\Skype\andersbender\media_messaging\media_cache\^3F60A93F08DDE063B5063BCBD834C97195A7C57F02DC6FBA14^pimgpsh_fullsize_distr.jpg"/>
+          <p:cNvPicPr>
+            <a:picLocks noChangeAspect="1" noChangeArrowheads="1"/>
+          </p:cNvPicPr>
+          <p:nvPr/>
+        </p:nvPicPr>
+        <p:blipFill>
+          <a:blip r:embed="rId3">
+            <a:extLst>
+              <a:ext uri="{BEBA8EAE-BF5A-486C-A8C5-ECC9F3942E4B}">
+                <a14:imgProps xmlns:a14="http://schemas.microsoft.com/office/drawing/2010/main">
+                  <a14:imgLayer r:embed="rId4">
+                    <a14:imgEffect>
+                      <a14:backgroundRemoval t="7407" b="88889" l="5634" r="91549">
+                        <a14:foregroundMark x1="35211" y1="50000" x2="35211" y2="50000"/>
+                        <a14:foregroundMark x1="49296" y1="33333" x2="7042" y2="75926"/>
+                        <a14:foregroundMark x1="76056" y1="46296" x2="91549" y2="75926"/>
+                        <a14:foregroundMark x1="22535" y1="77778" x2="73239" y2="81481"/>
+                      </a14:backgroundRemoval>
+                    </a14:imgEffect>
+                  </a14:imgLayer>
+                </a14:imgProps>
+              </a:ext>
+              <a:ext uri="{28A0092B-C50C-407E-A947-70E740481C1C}">
+                <a14:useLocalDpi xmlns:a14="http://schemas.microsoft.com/office/drawing/2010/main" val="0"/>
+              </a:ext>
+            </a:extLst>
+          </a:blip>
+          <a:srcRect/>
+          <a:stretch>
+            <a:fillRect/>
+          </a:stretch>
+        </p:blipFill>
+        <p:spPr bwMode="auto">
+          <a:xfrm rot="11594354">
+            <a:off x="5238148" y="2400236"/>
+            <a:ext cx="355793" cy="270603"/>
+          </a:xfrm>
+          <a:prstGeom prst="rect">
+            <a:avLst/>
+          </a:prstGeom>
+          <a:noFill/>
+          <a:extLst>
+            <a:ext uri="{909E8E84-426E-40DD-AFC4-6F175D3DCCD1}">
+              <a14:hiddenFill xmlns:a14="http://schemas.microsoft.com/office/drawing/2010/main">
+                <a:solidFill>
+                  <a:srgbClr val="FFFFFF"/>
+                </a:solidFill>
+              </a14:hiddenFill>
+            </a:ext>
+          </a:extLst>
+        </p:spPr>
+      </p:pic>
+      <p:cxnSp>
+        <p:nvCxnSpPr>
+          <p:cNvPr id="28" name="Straight Connector 27"/>
+          <p:cNvCxnSpPr/>
+          <p:nvPr/>
+        </p:nvCxnSpPr>
+        <p:spPr>
+          <a:xfrm flipV="1">
+            <a:off x="5676900" y="2733675"/>
+            <a:ext cx="457200" cy="619127"/>
+          </a:xfrm>
+          <a:prstGeom prst="line">
+            <a:avLst/>
+          </a:prstGeom>
+          <a:ln w="38100">
+            <a:solidFill>
+              <a:srgbClr val="FFFF00"/>
+            </a:solidFill>
+            <a:prstDash val="sysDash"/>
+          </a:ln>
+        </p:spPr>
+        <p:style>
+          <a:lnRef idx="1">
+            <a:schemeClr val="accent1"/>
+          </a:lnRef>
+          <a:fillRef idx="0">
+            <a:schemeClr val="accent1"/>
+          </a:fillRef>
+          <a:effectRef idx="0">
+            <a:schemeClr val="accent1"/>
+          </a:effectRef>
+          <a:fontRef idx="minor">
+            <a:schemeClr val="tx1"/>
+          </a:fontRef>
+        </p:style>
+      </p:cxnSp>
+      <p:pic>
+        <p:nvPicPr>
+          <p:cNvPr id="29" name="Picture 2" descr="C:\Project\detfederepo\unity\Assets\Sprites\Enemies\Alien.png"/>
+          <p:cNvPicPr>
+            <a:picLocks noChangeAspect="1" noChangeArrowheads="1"/>
+          </p:cNvPicPr>
+          <p:nvPr/>
+        </p:nvPicPr>
+        <p:blipFill>
+          <a:blip r:embed="rId5">
+            <a:extLst>
+              <a:ext uri="{28A0092B-C50C-407E-A947-70E740481C1C}">
+                <a14:useLocalDpi xmlns:a14="http://schemas.microsoft.com/office/drawing/2010/main" val="0"/>
+              </a:ext>
+            </a:extLst>
+          </a:blip>
+          <a:srcRect/>
+          <a:stretch>
+            <a:fillRect/>
+          </a:stretch>
+        </p:blipFill>
+        <p:spPr bwMode="auto">
+          <a:xfrm rot="12931224">
+            <a:off x="6021629" y="2477198"/>
+            <a:ext cx="351476" cy="351476"/>
+          </a:xfrm>
+          <a:prstGeom prst="rect">
+            <a:avLst/>
+          </a:prstGeom>
+          <a:noFill/>
+          <a:extLst>
+            <a:ext uri="{909E8E84-426E-40DD-AFC4-6F175D3DCCD1}">
+              <a14:hiddenFill xmlns:a14="http://schemas.microsoft.com/office/drawing/2010/main">
+                <a:solidFill>
+                  <a:srgbClr val="FFFFFF"/>
+                </a:solidFill>
+              </a14:hiddenFill>
+            </a:ext>
+          </a:extLst>
+        </p:spPr>
+      </p:pic>
+      <p:cxnSp>
+        <p:nvCxnSpPr>
+          <p:cNvPr id="32" name="Straight Connector 31"/>
+          <p:cNvCxnSpPr/>
+          <p:nvPr/>
+        </p:nvCxnSpPr>
+        <p:spPr>
+          <a:xfrm flipH="1" flipV="1">
+            <a:off x="5514975" y="2676525"/>
+            <a:ext cx="142875" cy="676275"/>
+          </a:xfrm>
+          <a:prstGeom prst="line">
+            <a:avLst/>
+          </a:prstGeom>
+          <a:ln w="38100">
+            <a:solidFill>
+              <a:srgbClr val="FFFF00"/>
+            </a:solidFill>
+            <a:prstDash val="sysDash"/>
+          </a:ln>
+        </p:spPr>
+        <p:style>
+          <a:lnRef idx="1">
+            <a:schemeClr val="accent1"/>
+          </a:lnRef>
+          <a:fillRef idx="0">
+            <a:schemeClr val="accent1"/>
+          </a:fillRef>
+          <a:effectRef idx="0">
+            <a:schemeClr val="accent1"/>
+          </a:effectRef>
+          <a:fontRef idx="minor">
+            <a:schemeClr val="tx1"/>
+          </a:fontRef>
+        </p:style>
+      </p:cxnSp>
+    </p:spTree>
+    <p:extLst>
+      <p:ext uri="{BB962C8B-B14F-4D97-AF65-F5344CB8AC3E}">
+        <p14:creationId xmlns:p14="http://schemas.microsoft.com/office/powerpoint/2010/main" val="4052010501"/>
       </p:ext>
     </p:extLst>
   </p:cSld>

</xml_diff>